<commit_message>
Updated lab assignments and term project rubric
</commit_message>
<xml_diff>
--- a/Notes and Slides/Wk9Day1-GeolocationOverview.pptx
+++ b/Notes and Slides/Wk9Day1-GeolocationOverview.pptx
@@ -5,24 +5,18 @@
     <p:sldMasterId id="2147483797" r:id="rId1"/>
   </p:sldMasterIdLst>
   <p:notesMasterIdLst>
-    <p:notesMasterId r:id="rId17"/>
+    <p:notesMasterId r:id="rId11"/>
   </p:notesMasterIdLst>
   <p:sldIdLst>
     <p:sldId id="256" r:id="rId2"/>
     <p:sldId id="264" r:id="rId3"/>
-    <p:sldId id="265" r:id="rId4"/>
-    <p:sldId id="266" r:id="rId5"/>
-    <p:sldId id="268" r:id="rId6"/>
-    <p:sldId id="269" r:id="rId7"/>
-    <p:sldId id="270" r:id="rId8"/>
-    <p:sldId id="272" r:id="rId9"/>
-    <p:sldId id="271" r:id="rId10"/>
-    <p:sldId id="273" r:id="rId11"/>
-    <p:sldId id="274" r:id="rId12"/>
-    <p:sldId id="267" r:id="rId13"/>
-    <p:sldId id="277" r:id="rId14"/>
-    <p:sldId id="275" r:id="rId15"/>
-    <p:sldId id="276" r:id="rId16"/>
+    <p:sldId id="271" r:id="rId4"/>
+    <p:sldId id="273" r:id="rId5"/>
+    <p:sldId id="274" r:id="rId6"/>
+    <p:sldId id="267" r:id="rId7"/>
+    <p:sldId id="277" r:id="rId8"/>
+    <p:sldId id="275" r:id="rId9"/>
+    <p:sldId id="276" r:id="rId10"/>
   </p:sldIdLst>
   <p:sldSz cx="9144000" cy="6858000" type="screen4x3"/>
   <p:notesSz cx="6858000" cy="9144000"/>
@@ -128,12 +122,6 @@
           <p14:sldIdLst>
             <p14:sldId id="256"/>
             <p14:sldId id="264"/>
-            <p14:sldId id="265"/>
-            <p14:sldId id="266"/>
-            <p14:sldId id="268"/>
-            <p14:sldId id="269"/>
-            <p14:sldId id="270"/>
-            <p14:sldId id="272"/>
             <p14:sldId id="271"/>
             <p14:sldId id="273"/>
             <p14:sldId id="274"/>
@@ -147,6 +135,20 @@
           <p14:sldIdLst/>
         </p14:section>
       </p14:sectionLst>
+    </p:ext>
+    <p:ext uri="{EFAFB233-063F-42B5-8137-9DF3F51BA10A}">
+      <p15:sldGuideLst xmlns:p15="http://schemas.microsoft.com/office/powerpoint/2012/main">
+        <p15:guide id="1" orient="horz" pos="2160">
+          <p15:clr>
+            <a:srgbClr val="A4A3A4"/>
+          </p15:clr>
+        </p15:guide>
+        <p15:guide id="2" pos="2880">
+          <p15:clr>
+            <a:srgbClr val="A4A3A4"/>
+          </p15:clr>
+        </p15:guide>
+      </p15:sldGuideLst>
     </p:ext>
   </p:extLst>
 </p:presentation>
@@ -234,7 +236,7 @@
           <a:p>
             <a:fld id="{59B6F58A-1DC9-9140-A6F1-5CAF629CE03F}" type="datetimeFigureOut">
               <a:rPr lang="en-US" smtClean="0"/>
-              <a:t>5/23/16</a:t>
+              <a:t>6/7/17</a:t>
             </a:fld>
             <a:endParaRPr lang="en-US"/>
           </a:p>
@@ -671,7 +673,7 @@
           <a:p>
             <a:fld id="{E94675F0-C2CB-0246-91F1-0967C899A5BC}" type="slidenum">
               <a:rPr lang="en-US" smtClean="0"/>
-              <a:t>9</a:t>
+              <a:t>3</a:t>
             </a:fld>
             <a:endParaRPr lang="en-US"/>
           </a:p>
@@ -771,7 +773,7 @@
           <a:p>
             <a:fld id="{E94675F0-C2CB-0246-91F1-0967C899A5BC}" type="slidenum">
               <a:rPr lang="en-US" smtClean="0"/>
-              <a:t>11</a:t>
+              <a:t>5</a:t>
             </a:fld>
             <a:endParaRPr lang="en-US"/>
           </a:p>
@@ -887,7 +889,7 @@
           <a:p>
             <a:fld id="{E94675F0-C2CB-0246-91F1-0967C899A5BC}" type="slidenum">
               <a:rPr lang="en-US" smtClean="0"/>
-              <a:t>12</a:t>
+              <a:t>6</a:t>
             </a:fld>
             <a:endParaRPr lang="en-US"/>
           </a:p>
@@ -988,7 +990,7 @@
           <a:p>
             <a:fld id="{E94675F0-C2CB-0246-91F1-0967C899A5BC}" type="slidenum">
               <a:rPr lang="en-US" smtClean="0"/>
-              <a:t>13</a:t>
+              <a:t>7</a:t>
             </a:fld>
             <a:endParaRPr lang="en-US"/>
           </a:p>
@@ -1088,7 +1090,7 @@
           <a:p>
             <a:fld id="{E94675F0-C2CB-0246-91F1-0967C899A5BC}" type="slidenum">
               <a:rPr lang="en-US" smtClean="0"/>
-              <a:t>14</a:t>
+              <a:t>8</a:t>
             </a:fld>
             <a:endParaRPr lang="en-US"/>
           </a:p>
@@ -1292,7 +1294,7 @@
           <a:p>
             <a:fld id="{7CE38E4D-051A-41E1-86A4-E56916468FD0}" type="datetimeFigureOut">
               <a:rPr lang="en-US" smtClean="0"/>
-              <a:t>5/23/16</a:t>
+              <a:t>6/7/17</a:t>
             </a:fld>
             <a:endParaRPr lang="en-US"/>
           </a:p>
@@ -1457,7 +1459,7 @@
           <a:p>
             <a:fld id="{7CE38E4D-051A-41E1-86A4-E56916468FD0}" type="datetimeFigureOut">
               <a:rPr lang="en-US" smtClean="0"/>
-              <a:t>5/23/16</a:t>
+              <a:t>6/7/17</a:t>
             </a:fld>
             <a:endParaRPr lang="en-US"/>
           </a:p>
@@ -1632,7 +1634,7 @@
           <a:p>
             <a:fld id="{7CE38E4D-051A-41E1-86A4-E56916468FD0}" type="datetimeFigureOut">
               <a:rPr lang="en-US" smtClean="0"/>
-              <a:t>5/23/16</a:t>
+              <a:t>6/7/17</a:t>
             </a:fld>
             <a:endParaRPr lang="en-US"/>
           </a:p>
@@ -1797,7 +1799,7 @@
           <a:p>
             <a:fld id="{7CE38E4D-051A-41E1-86A4-E56916468FD0}" type="datetimeFigureOut">
               <a:rPr lang="en-US" smtClean="0"/>
-              <a:t>5/23/16</a:t>
+              <a:t>6/7/17</a:t>
             </a:fld>
             <a:endParaRPr lang="en-US"/>
           </a:p>
@@ -2036,7 +2038,7 @@
           <a:p>
             <a:fld id="{7CE38E4D-051A-41E1-86A4-E56916468FD0}" type="datetimeFigureOut">
               <a:rPr lang="en-US" smtClean="0"/>
-              <a:t>5/23/16</a:t>
+              <a:t>6/7/17</a:t>
             </a:fld>
             <a:endParaRPr lang="en-US"/>
           </a:p>
@@ -2319,7 +2321,7 @@
           <a:p>
             <a:fld id="{7CE38E4D-051A-41E1-86A4-E56916468FD0}" type="datetimeFigureOut">
               <a:rPr lang="en-US" smtClean="0"/>
-              <a:t>5/23/16</a:t>
+              <a:t>6/7/17</a:t>
             </a:fld>
             <a:endParaRPr lang="en-US"/>
           </a:p>
@@ -2736,7 +2738,7 @@
           <a:p>
             <a:fld id="{7CE38E4D-051A-41E1-86A4-E56916468FD0}" type="datetimeFigureOut">
               <a:rPr lang="en-US" smtClean="0"/>
-              <a:t>5/23/16</a:t>
+              <a:t>6/7/17</a:t>
             </a:fld>
             <a:endParaRPr lang="en-US"/>
           </a:p>
@@ -2849,7 +2851,7 @@
           <a:p>
             <a:fld id="{7CE38E4D-051A-41E1-86A4-E56916468FD0}" type="datetimeFigureOut">
               <a:rPr lang="en-US" smtClean="0"/>
-              <a:t>5/23/16</a:t>
+              <a:t>6/7/17</a:t>
             </a:fld>
             <a:endParaRPr lang="en-US"/>
           </a:p>
@@ -2939,7 +2941,7 @@
           <a:p>
             <a:fld id="{7CE38E4D-051A-41E1-86A4-E56916468FD0}" type="datetimeFigureOut">
               <a:rPr lang="en-US" smtClean="0"/>
-              <a:t>5/23/16</a:t>
+              <a:t>6/7/17</a:t>
             </a:fld>
             <a:endParaRPr lang="en-US"/>
           </a:p>
@@ -3218,7 +3220,7 @@
           <a:p>
             <a:fld id="{7CE38E4D-051A-41E1-86A4-E56916468FD0}" type="datetimeFigureOut">
               <a:rPr lang="en-US" smtClean="0"/>
-              <a:t>5/23/16</a:t>
+              <a:t>6/7/17</a:t>
             </a:fld>
             <a:endParaRPr lang="en-US"/>
           </a:p>
@@ -3477,7 +3479,7 @@
           <a:p>
             <a:fld id="{7CE38E4D-051A-41E1-86A4-E56916468FD0}" type="datetimeFigureOut">
               <a:rPr lang="en-US" smtClean="0"/>
-              <a:t>5/23/16</a:t>
+              <a:t>6/7/17</a:t>
             </a:fld>
             <a:endParaRPr lang="en-US"/>
           </a:p>
@@ -3685,7 +3687,7 @@
           <a:p>
             <a:fld id="{7CE38E4D-051A-41E1-86A4-E56916468FD0}" type="datetimeFigureOut">
               <a:rPr lang="en-US" smtClean="0"/>
-              <a:t>5/23/16</a:t>
+              <a:t>6/7/17</a:t>
             </a:fld>
             <a:endParaRPr lang="en-US"/>
           </a:p>
@@ -4262,14 +4264,14 @@
   <p:timing>
     <p:tnLst>
       <p:par>
-        <p:cTn xmlns:p14="http://schemas.microsoft.com/office/powerpoint/2010/main" id="1" dur="indefinite" restart="never" nodeType="tmRoot"/>
+        <p:cTn id="1" dur="indefinite" restart="never" nodeType="tmRoot"/>
       </p:par>
     </p:tnLst>
   </p:timing>
 </p:sld>
 </file>
 
-<file path=ppt/slides/slide10.xml><?xml version="1.0" encoding="utf-8"?>
+<file path=ppt/slides/slide2.xml><?xml version="1.0" encoding="utf-8"?>
 <p:sld xmlns:a="http://schemas.openxmlformats.org/drawingml/2006/main" xmlns:r="http://schemas.openxmlformats.org/officeDocument/2006/relationships" xmlns:p="http://schemas.openxmlformats.org/presentationml/2006/main">
   <p:cSld>
     <p:spTree>
@@ -4288,7 +4290,7 @@
       </p:grpSpPr>
       <p:sp>
         <p:nvSpPr>
-          <p:cNvPr id="2" name="Title 1"/>
+          <p:cNvPr id="6" name="Title 5"/>
           <p:cNvSpPr>
             <a:spLocks noGrp="1"/>
           </p:cNvSpPr>
@@ -4298,84 +4300,743 @@
         </p:nvSpPr>
         <p:spPr/>
         <p:txBody>
-          <a:bodyPr/>
+          <a:bodyPr>
+            <a:normAutofit/>
+          </a:bodyPr>
           <a:lstStyle/>
           <a:p>
             <a:r>
               <a:rPr lang="en-US" dirty="0" smtClean="0"/>
-              <a:t>Geolocation APIs</a:t>
+              <a:t>Course Schedule</a:t>
             </a:r>
             <a:endParaRPr lang="en-US" dirty="0"/>
           </a:p>
         </p:txBody>
       </p:sp>
-      <p:sp>
-        <p:nvSpPr>
-          <p:cNvPr id="3" name="Content Placeholder 2"/>
-          <p:cNvSpPr>
-            <a:spLocks noGrp="1"/>
-          </p:cNvSpPr>
-          <p:nvPr>
-            <p:ph idx="1"/>
-          </p:nvPr>
-        </p:nvSpPr>
-        <p:spPr/>
-        <p:txBody>
-          <a:bodyPr/>
-          <a:lstStyle/>
-          <a:p>
-            <a:pPr marL="0" indent="0">
-              <a:buNone/>
-            </a:pPr>
-            <a:r>
-              <a:rPr lang="en-US" dirty="0" smtClean="0"/>
-              <a:t>Information provided:</a:t>
-            </a:r>
-          </a:p>
-          <a:p>
-            <a:r>
-              <a:rPr lang="en-US" dirty="0" smtClean="0"/>
-              <a:t>Latitude and longitude</a:t>
-            </a:r>
-          </a:p>
-          <a:p>
-            <a:r>
-              <a:rPr lang="en-US" dirty="0" smtClean="0"/>
-              <a:t>Altitude</a:t>
-            </a:r>
-          </a:p>
-          <a:p>
-            <a:r>
-              <a:rPr lang="en-US" dirty="0" smtClean="0"/>
-              <a:t>Speed</a:t>
-            </a:r>
-          </a:p>
-          <a:p>
-            <a:r>
-              <a:rPr lang="en-US" dirty="0" smtClean="0"/>
-              <a:t>Heading</a:t>
-            </a:r>
-          </a:p>
-          <a:p>
-            <a:pPr lvl="1"/>
-            <a:endParaRPr lang="en-US" dirty="0"/>
-          </a:p>
-        </p:txBody>
-      </p:sp>
+      <p:graphicFrame>
+        <p:nvGraphicFramePr>
+          <p:cNvPr id="5" name="Content Placeholder 4"/>
+          <p:cNvGraphicFramePr>
+            <a:graphicFrameLocks noGrp="1"/>
+          </p:cNvGraphicFramePr>
+          <p:nvPr>
+            <p:ph sz="half" idx="1"/>
+            <p:extLst>
+              <p:ext uri="{D42A27DB-BD31-4B8C-83A1-F6EECF244321}">
+                <p14:modId xmlns:p14="http://schemas.microsoft.com/office/powerpoint/2010/main" val="543435626"/>
+              </p:ext>
+            </p:extLst>
+          </p:nvPr>
+        </p:nvGraphicFramePr>
+        <p:xfrm>
+          <a:off x="356277" y="2033752"/>
+          <a:ext cx="3991801" cy="4206798"/>
+        </p:xfrm>
+        <a:graphic>
+          <a:graphicData uri="http://schemas.openxmlformats.org/drawingml/2006/table">
+            <a:tbl>
+              <a:tblPr firstRow="1" bandRow="1">
+                <a:tableStyleId>{775DCB02-9BB8-47FD-8907-85C794F793BA}</a:tableStyleId>
+              </a:tblPr>
+              <a:tblGrid>
+                <a:gridCol w="634323"/>
+                <a:gridCol w="3357478"/>
+              </a:tblGrid>
+              <a:tr h="427278">
+                <a:tc>
+                  <a:txBody>
+                    <a:bodyPr/>
+                    <a:lstStyle/>
+                    <a:p>
+                      <a:r>
+                        <a:rPr lang="en-US" dirty="0" smtClean="0"/>
+                        <a:t>Wk</a:t>
+                      </a:r>
+                      <a:endParaRPr lang="en-US" dirty="0"/>
+                    </a:p>
+                  </a:txBody>
+                  <a:tcPr/>
+                </a:tc>
+                <a:tc>
+                  <a:txBody>
+                    <a:bodyPr/>
+                    <a:lstStyle/>
+                    <a:p>
+                      <a:r>
+                        <a:rPr lang="en-US" dirty="0" smtClean="0"/>
+                        <a:t>Topic</a:t>
+                      </a:r>
+                      <a:endParaRPr lang="en-US" dirty="0"/>
+                    </a:p>
+                  </a:txBody>
+                  <a:tcPr/>
+                </a:tc>
+              </a:tr>
+              <a:tr h="942660">
+                <a:tc>
+                  <a:txBody>
+                    <a:bodyPr/>
+                    <a:lstStyle/>
+                    <a:p>
+                      <a:r>
+                        <a:rPr lang="en-US" sz="2800" dirty="0" smtClean="0"/>
+                        <a:t>1</a:t>
+                      </a:r>
+                      <a:endParaRPr lang="en-US" sz="2800" dirty="0"/>
+                    </a:p>
+                  </a:txBody>
+                  <a:tcPr>
+                    <a:solidFill>
+                      <a:schemeClr val="bg2">
+                        <a:lumMod val="25000"/>
+                        <a:lumOff val="75000"/>
+                        <a:alpha val="40000"/>
+                      </a:schemeClr>
+                    </a:solidFill>
+                  </a:tcPr>
+                </a:tc>
+                <a:tc>
+                  <a:txBody>
+                    <a:bodyPr/>
+                    <a:lstStyle/>
+                    <a:p>
+                      <a:pPr marL="0" marR="0" indent="0" algn="l" defTabSz="457200" rtl="0" eaLnBrk="1" fontAlgn="auto" latinLnBrk="0" hangingPunct="1">
+                        <a:lnSpc>
+                          <a:spcPct val="100000"/>
+                        </a:lnSpc>
+                        <a:spcBef>
+                          <a:spcPts val="0"/>
+                        </a:spcBef>
+                        <a:spcAft>
+                          <a:spcPts val="0"/>
+                        </a:spcAft>
+                        <a:buClrTx/>
+                        <a:buSzTx/>
+                        <a:buFontTx/>
+                        <a:buNone/>
+                        <a:tabLst/>
+                        <a:defRPr/>
+                      </a:pPr>
+                      <a:r>
+                        <a:rPr lang="en-US" sz="2800" dirty="0" smtClean="0"/>
+                        <a:t>Intro</a:t>
+                      </a:r>
+                      <a:r>
+                        <a:rPr lang="en-US" sz="2800" baseline="0" dirty="0" smtClean="0"/>
+                        <a:t> +</a:t>
+                      </a:r>
+                      <a:r>
+                        <a:rPr lang="en-US" sz="2800" dirty="0" smtClean="0"/>
+                        <a:t> single-screen apps</a:t>
+                      </a:r>
+                    </a:p>
+                  </a:txBody>
+                  <a:tcPr>
+                    <a:solidFill>
+                      <a:schemeClr val="bg2">
+                        <a:lumMod val="25000"/>
+                        <a:lumOff val="75000"/>
+                        <a:alpha val="40000"/>
+                      </a:schemeClr>
+                    </a:solidFill>
+                  </a:tcPr>
+                </a:tc>
+              </a:tr>
+              <a:tr h="942660">
+                <a:tc>
+                  <a:txBody>
+                    <a:bodyPr/>
+                    <a:lstStyle/>
+                    <a:p>
+                      <a:r>
+                        <a:rPr lang="en-US" sz="2800" dirty="0" smtClean="0"/>
+                        <a:t>2</a:t>
+                      </a:r>
+                      <a:endParaRPr lang="en-US" sz="2800" dirty="0"/>
+                    </a:p>
+                  </a:txBody>
+                  <a:tcPr>
+                    <a:solidFill>
+                      <a:schemeClr val="bg2">
+                        <a:lumMod val="10000"/>
+                        <a:lumOff val="90000"/>
+                      </a:schemeClr>
+                    </a:solidFill>
+                  </a:tcPr>
+                </a:tc>
+                <a:tc>
+                  <a:txBody>
+                    <a:bodyPr/>
+                    <a:lstStyle/>
+                    <a:p>
+                      <a:pPr marL="0" marR="0" indent="0" algn="l" defTabSz="457200" rtl="0" eaLnBrk="1" fontAlgn="auto" latinLnBrk="0" hangingPunct="1">
+                        <a:lnSpc>
+                          <a:spcPct val="100000"/>
+                        </a:lnSpc>
+                        <a:spcBef>
+                          <a:spcPts val="0"/>
+                        </a:spcBef>
+                        <a:spcAft>
+                          <a:spcPts val="0"/>
+                        </a:spcAft>
+                        <a:buClrTx/>
+                        <a:buSzTx/>
+                        <a:buFontTx/>
+                        <a:buNone/>
+                        <a:tabLst/>
+                        <a:defRPr/>
+                      </a:pPr>
+                      <a:r>
+                        <a:rPr lang="en-US" sz="2800" dirty="0" smtClean="0"/>
+                        <a:t>Multi-screen (multi-activity) apps</a:t>
+                      </a:r>
+                    </a:p>
+                  </a:txBody>
+                  <a:tcPr>
+                    <a:solidFill>
+                      <a:schemeClr val="bg2">
+                        <a:lumMod val="10000"/>
+                        <a:lumOff val="90000"/>
+                      </a:schemeClr>
+                    </a:solidFill>
+                  </a:tcPr>
+                </a:tc>
+              </a:tr>
+              <a:tr h="942660">
+                <a:tc>
+                  <a:txBody>
+                    <a:bodyPr/>
+                    <a:lstStyle/>
+                    <a:p>
+                      <a:r>
+                        <a:rPr lang="en-US" sz="2800" dirty="0" smtClean="0"/>
+                        <a:t>3</a:t>
+                      </a:r>
+                      <a:endParaRPr lang="en-US" sz="2800" dirty="0"/>
+                    </a:p>
+                  </a:txBody>
+                  <a:tcPr>
+                    <a:solidFill>
+                      <a:schemeClr val="bg2">
+                        <a:lumMod val="25000"/>
+                        <a:lumOff val="75000"/>
+                        <a:alpha val="40000"/>
+                      </a:schemeClr>
+                    </a:solidFill>
+                  </a:tcPr>
+                </a:tc>
+                <a:tc>
+                  <a:txBody>
+                    <a:bodyPr/>
+                    <a:lstStyle/>
+                    <a:p>
+                      <a:pPr marL="0" marR="0" indent="0" algn="l" defTabSz="457200" rtl="0" eaLnBrk="1" fontAlgn="auto" latinLnBrk="0" hangingPunct="1">
+                        <a:lnSpc>
+                          <a:spcPct val="100000"/>
+                        </a:lnSpc>
+                        <a:spcBef>
+                          <a:spcPts val="0"/>
+                        </a:spcBef>
+                        <a:spcAft>
+                          <a:spcPts val="0"/>
+                        </a:spcAft>
+                        <a:buClrTx/>
+                        <a:buSzTx/>
+                        <a:buFontTx/>
+                        <a:buNone/>
+                        <a:tabLst/>
+                        <a:defRPr/>
+                      </a:pPr>
+                      <a:r>
+                        <a:rPr lang="en-US" sz="2800" dirty="0" smtClean="0"/>
+                        <a:t>Activity lifecycle</a:t>
+                      </a:r>
+                      <a:r>
+                        <a:rPr lang="en-US" sz="2800" baseline="0" dirty="0" smtClean="0"/>
+                        <a:t> and state</a:t>
+                      </a:r>
+                      <a:endParaRPr lang="en-US" sz="2800" dirty="0" smtClean="0"/>
+                    </a:p>
+                  </a:txBody>
+                  <a:tcPr>
+                    <a:solidFill>
+                      <a:schemeClr val="bg2">
+                        <a:lumMod val="25000"/>
+                        <a:lumOff val="75000"/>
+                        <a:alpha val="40000"/>
+                      </a:schemeClr>
+                    </a:solidFill>
+                  </a:tcPr>
+                </a:tc>
+              </a:tr>
+              <a:tr h="516942">
+                <a:tc>
+                  <a:txBody>
+                    <a:bodyPr/>
+                    <a:lstStyle/>
+                    <a:p>
+                      <a:r>
+                        <a:rPr lang="en-US" sz="2800" dirty="0" smtClean="0"/>
+                        <a:t>4</a:t>
+                      </a:r>
+                    </a:p>
+                    <a:p>
+                      <a:r>
+                        <a:rPr lang="en-US" sz="2800" dirty="0" smtClean="0"/>
+                        <a:t>5</a:t>
+                      </a:r>
+                      <a:endParaRPr lang="en-US" sz="2800" dirty="0"/>
+                    </a:p>
+                  </a:txBody>
+                  <a:tcPr>
+                    <a:solidFill>
+                      <a:schemeClr val="bg2">
+                        <a:lumMod val="10000"/>
+                        <a:lumOff val="90000"/>
+                      </a:schemeClr>
+                    </a:solidFill>
+                  </a:tcPr>
+                </a:tc>
+                <a:tc>
+                  <a:txBody>
+                    <a:bodyPr/>
+                    <a:lstStyle/>
+                    <a:p>
+                      <a:pPr marL="0" marR="0" indent="0" algn="l" defTabSz="457200" rtl="0" eaLnBrk="1" fontAlgn="auto" latinLnBrk="0" hangingPunct="1">
+                        <a:lnSpc>
+                          <a:spcPct val="100000"/>
+                        </a:lnSpc>
+                        <a:spcBef>
+                          <a:spcPts val="0"/>
+                        </a:spcBef>
+                        <a:spcAft>
+                          <a:spcPts val="0"/>
+                        </a:spcAft>
+                        <a:buClrTx/>
+                        <a:buSzTx/>
+                        <a:buFontTx/>
+                        <a:buNone/>
+                        <a:tabLst/>
+                        <a:defRPr/>
+                      </a:pPr>
+                      <a:r>
+                        <a:rPr lang="en-US" sz="2800" dirty="0" smtClean="0"/>
+                        <a:t>List</a:t>
+                      </a:r>
+                      <a:r>
+                        <a:rPr lang="en-US" sz="2800" baseline="0" dirty="0" smtClean="0"/>
+                        <a:t> Views + Adapters</a:t>
+                      </a:r>
+                      <a:endParaRPr lang="en-US" sz="2800" dirty="0" smtClean="0"/>
+                    </a:p>
+                  </a:txBody>
+                  <a:tcPr>
+                    <a:solidFill>
+                      <a:schemeClr val="bg2">
+                        <a:lumMod val="10000"/>
+                        <a:lumOff val="90000"/>
+                      </a:schemeClr>
+                    </a:solidFill>
+                  </a:tcPr>
+                </a:tc>
+              </a:tr>
+            </a:tbl>
+          </a:graphicData>
+        </a:graphic>
+      </p:graphicFrame>
+      <p:graphicFrame>
+        <p:nvGraphicFramePr>
+          <p:cNvPr id="8" name="Content Placeholder 7"/>
+          <p:cNvGraphicFramePr>
+            <a:graphicFrameLocks noGrp="1"/>
+          </p:cNvGraphicFramePr>
+          <p:nvPr>
+            <p:ph sz="half" idx="2"/>
+            <p:extLst>
+              <p:ext uri="{D42A27DB-BD31-4B8C-83A1-F6EECF244321}">
+                <p14:modId xmlns:p14="http://schemas.microsoft.com/office/powerpoint/2010/main" val="342647097"/>
+              </p:ext>
+            </p:extLst>
+          </p:nvPr>
+        </p:nvGraphicFramePr>
+        <p:xfrm>
+          <a:off x="4507872" y="2033752"/>
+          <a:ext cx="4297617" cy="4206799"/>
+        </p:xfrm>
+        <a:graphic>
+          <a:graphicData uri="http://schemas.openxmlformats.org/drawingml/2006/table">
+            <a:tbl>
+              <a:tblPr firstRow="1" bandRow="1">
+                <a:tableStyleId>{775DCB02-9BB8-47FD-8907-85C794F793BA}</a:tableStyleId>
+              </a:tblPr>
+              <a:tblGrid>
+                <a:gridCol w="608414"/>
+                <a:gridCol w="3689203"/>
+              </a:tblGrid>
+              <a:tr h="388067">
+                <a:tc>
+                  <a:txBody>
+                    <a:bodyPr/>
+                    <a:lstStyle/>
+                    <a:p>
+                      <a:r>
+                        <a:rPr lang="en-US" dirty="0" smtClean="0"/>
+                        <a:t>Wk</a:t>
+                      </a:r>
+                      <a:endParaRPr lang="en-US" dirty="0"/>
+                    </a:p>
+                  </a:txBody>
+                  <a:tcPr/>
+                </a:tc>
+                <a:tc>
+                  <a:txBody>
+                    <a:bodyPr/>
+                    <a:lstStyle/>
+                    <a:p>
+                      <a:r>
+                        <a:rPr lang="en-US" dirty="0" smtClean="0"/>
+                        <a:t>Topic</a:t>
+                      </a:r>
+                      <a:endParaRPr lang="en-US" dirty="0"/>
+                    </a:p>
+                  </a:txBody>
+                  <a:tcPr/>
+                </a:tc>
+              </a:tr>
+              <a:tr h="685728">
+                <a:tc>
+                  <a:txBody>
+                    <a:bodyPr/>
+                    <a:lstStyle/>
+                    <a:p>
+                      <a:r>
+                        <a:rPr lang="en-US" sz="2800" dirty="0" smtClean="0"/>
+                        <a:t>5</a:t>
+                      </a:r>
+                      <a:endParaRPr lang="en-US" sz="2800" dirty="0"/>
+                    </a:p>
+                  </a:txBody>
+                  <a:tcPr>
+                    <a:solidFill>
+                      <a:schemeClr val="tx2">
+                        <a:lumMod val="90000"/>
+                        <a:alpha val="40000"/>
+                      </a:schemeClr>
+                    </a:solidFill>
+                  </a:tcPr>
+                </a:tc>
+                <a:tc>
+                  <a:txBody>
+                    <a:bodyPr/>
+                    <a:lstStyle/>
+                    <a:p>
+                      <a:pPr marL="0" marR="0" indent="0" algn="l" defTabSz="457200" rtl="0" eaLnBrk="1" fontAlgn="auto" latinLnBrk="0" hangingPunct="1">
+                        <a:lnSpc>
+                          <a:spcPct val="100000"/>
+                        </a:lnSpc>
+                        <a:spcBef>
+                          <a:spcPts val="0"/>
+                        </a:spcBef>
+                        <a:spcAft>
+                          <a:spcPts val="0"/>
+                        </a:spcAft>
+                        <a:buClrTx/>
+                        <a:buSzTx/>
+                        <a:buFontTx/>
+                        <a:buNone/>
+                        <a:tabLst/>
+                        <a:defRPr/>
+                      </a:pPr>
+                      <a:r>
+                        <a:rPr lang="en-US" sz="2800" dirty="0" smtClean="0"/>
+                        <a:t>Layouts + </a:t>
+                      </a:r>
+                      <a:r>
+                        <a:rPr lang="en-US" sz="2800" baseline="0" dirty="0" smtClean="0"/>
+                        <a:t>orientation</a:t>
+                      </a:r>
+                      <a:endParaRPr lang="en-US" sz="2800" dirty="0" smtClean="0"/>
+                    </a:p>
+                  </a:txBody>
+                  <a:tcPr>
+                    <a:solidFill>
+                      <a:schemeClr val="tx2">
+                        <a:lumMod val="90000"/>
+                        <a:alpha val="40000"/>
+                      </a:schemeClr>
+                    </a:solidFill>
+                  </a:tcPr>
+                </a:tc>
+              </a:tr>
+              <a:tr h="1016083">
+                <a:tc>
+                  <a:txBody>
+                    <a:bodyPr/>
+                    <a:lstStyle/>
+                    <a:p>
+                      <a:r>
+                        <a:rPr lang="en-US" sz="2800" dirty="0" smtClean="0"/>
+                        <a:t>7</a:t>
+                      </a:r>
+                      <a:endParaRPr lang="en-US" sz="2800" dirty="0"/>
+                    </a:p>
+                  </a:txBody>
+                  <a:tcPr>
+                    <a:solidFill>
+                      <a:schemeClr val="bg2">
+                        <a:lumMod val="25000"/>
+                        <a:lumOff val="75000"/>
+                        <a:alpha val="40000"/>
+                      </a:schemeClr>
+                    </a:solidFill>
+                  </a:tcPr>
+                </a:tc>
+                <a:tc>
+                  <a:txBody>
+                    <a:bodyPr/>
+                    <a:lstStyle/>
+                    <a:p>
+                      <a:pPr marL="0" marR="0" indent="0" algn="l" defTabSz="457200" rtl="0" eaLnBrk="1" fontAlgn="auto" latinLnBrk="0" hangingPunct="1">
+                        <a:lnSpc>
+                          <a:spcPct val="100000"/>
+                        </a:lnSpc>
+                        <a:spcBef>
+                          <a:spcPts val="0"/>
+                        </a:spcBef>
+                        <a:spcAft>
+                          <a:spcPts val="0"/>
+                        </a:spcAft>
+                        <a:buClrTx/>
+                        <a:buSzTx/>
+                        <a:buFontTx/>
+                        <a:buNone/>
+                        <a:tabLst/>
+                        <a:defRPr/>
+                      </a:pPr>
+                      <a:r>
+                        <a:rPr lang="en-US" sz="2800" dirty="0" smtClean="0"/>
+                        <a:t>Adapting to size and orientation: fragments</a:t>
+                      </a:r>
+                    </a:p>
+                  </a:txBody>
+                  <a:tcPr>
+                    <a:solidFill>
+                      <a:schemeClr val="bg2">
+                        <a:lumMod val="25000"/>
+                        <a:lumOff val="75000"/>
+                        <a:alpha val="40000"/>
+                      </a:schemeClr>
+                    </a:solidFill>
+                  </a:tcPr>
+                </a:tc>
+              </a:tr>
+              <a:tr h="557207">
+                <a:tc>
+                  <a:txBody>
+                    <a:bodyPr/>
+                    <a:lstStyle/>
+                    <a:p>
+                      <a:r>
+                        <a:rPr lang="en-US" sz="2800" dirty="0" smtClean="0"/>
+                        <a:t>8</a:t>
+                      </a:r>
+                      <a:endParaRPr lang="en-US" sz="2800" dirty="0"/>
+                    </a:p>
+                  </a:txBody>
+                  <a:tcPr>
+                    <a:solidFill>
+                      <a:schemeClr val="bg2">
+                        <a:lumMod val="10000"/>
+                        <a:lumOff val="90000"/>
+                        <a:alpha val="40000"/>
+                      </a:schemeClr>
+                    </a:solidFill>
+                  </a:tcPr>
+                </a:tc>
+                <a:tc>
+                  <a:txBody>
+                    <a:bodyPr/>
+                    <a:lstStyle/>
+                    <a:p>
+                      <a:pPr marL="0" marR="0" indent="0" algn="l" defTabSz="457200" rtl="0" eaLnBrk="1" fontAlgn="auto" latinLnBrk="0" hangingPunct="1">
+                        <a:lnSpc>
+                          <a:spcPct val="100000"/>
+                        </a:lnSpc>
+                        <a:spcBef>
+                          <a:spcPts val="0"/>
+                        </a:spcBef>
+                        <a:spcAft>
+                          <a:spcPts val="0"/>
+                        </a:spcAft>
+                        <a:buClrTx/>
+                        <a:buSzTx/>
+                        <a:buFontTx/>
+                        <a:buNone/>
+                        <a:tabLst/>
+                        <a:defRPr/>
+                      </a:pPr>
+                      <a:r>
+                        <a:rPr lang="en-US" sz="2800" dirty="0" smtClean="0"/>
+                        <a:t>Managing data: SQLite</a:t>
+                      </a:r>
+                    </a:p>
+                  </a:txBody>
+                  <a:tcPr>
+                    <a:solidFill>
+                      <a:schemeClr val="bg2">
+                        <a:lumMod val="10000"/>
+                        <a:lumOff val="90000"/>
+                        <a:alpha val="40000"/>
+                      </a:schemeClr>
+                    </a:solidFill>
+                  </a:tcPr>
+                </a:tc>
+              </a:tr>
+              <a:tr h="1002507">
+                <a:tc>
+                  <a:txBody>
+                    <a:bodyPr/>
+                    <a:lstStyle/>
+                    <a:p>
+                      <a:r>
+                        <a:rPr lang="en-US" sz="2800" dirty="0" smtClean="0"/>
+                        <a:t>9</a:t>
+                      </a:r>
+                      <a:endParaRPr lang="en-US" sz="2800" dirty="0"/>
+                    </a:p>
+                  </a:txBody>
+                  <a:tcPr>
+                    <a:solidFill>
+                      <a:schemeClr val="bg2">
+                        <a:lumMod val="25000"/>
+                        <a:lumOff val="75000"/>
+                        <a:alpha val="40000"/>
+                      </a:schemeClr>
+                    </a:solidFill>
+                  </a:tcPr>
+                </a:tc>
+                <a:tc>
+                  <a:txBody>
+                    <a:bodyPr/>
+                    <a:lstStyle/>
+                    <a:p>
+                      <a:pPr marL="0" marR="0" indent="0" algn="l" defTabSz="457200" rtl="0" eaLnBrk="1" fontAlgn="auto" latinLnBrk="0" hangingPunct="1">
+                        <a:lnSpc>
+                          <a:spcPct val="100000"/>
+                        </a:lnSpc>
+                        <a:spcBef>
+                          <a:spcPts val="0"/>
+                        </a:spcBef>
+                        <a:spcAft>
+                          <a:spcPts val="0"/>
+                        </a:spcAft>
+                        <a:buClrTx/>
+                        <a:buSzTx/>
+                        <a:buFontTx/>
+                        <a:buNone/>
+                        <a:tabLst/>
+                        <a:defRPr/>
+                      </a:pPr>
+                      <a:r>
+                        <a:rPr lang="en-US" sz="2800" dirty="0" smtClean="0"/>
+                        <a:t>Consuming web services</a:t>
+                      </a:r>
+                    </a:p>
+                  </a:txBody>
+                  <a:tcPr>
+                    <a:solidFill>
+                      <a:schemeClr val="bg2">
+                        <a:lumMod val="25000"/>
+                        <a:lumOff val="75000"/>
+                        <a:alpha val="40000"/>
+                      </a:schemeClr>
+                    </a:solidFill>
+                  </a:tcPr>
+                </a:tc>
+              </a:tr>
+              <a:tr h="557207">
+                <a:tc>
+                  <a:txBody>
+                    <a:bodyPr/>
+                    <a:lstStyle/>
+                    <a:p>
+                      <a:r>
+                        <a:rPr lang="en-US" sz="2800" dirty="0" smtClean="0"/>
+                        <a:t>10</a:t>
+                      </a:r>
+                      <a:endParaRPr lang="en-US" sz="2800" dirty="0"/>
+                    </a:p>
+                  </a:txBody>
+                  <a:tcPr>
+                    <a:solidFill>
+                      <a:srgbClr val="FFFF00">
+                        <a:alpha val="40000"/>
+                      </a:srgbClr>
+                    </a:solidFill>
+                  </a:tcPr>
+                </a:tc>
+                <a:tc>
+                  <a:txBody>
+                    <a:bodyPr/>
+                    <a:lstStyle/>
+                    <a:p>
+                      <a:pPr marL="0" marR="0" indent="0" algn="l" defTabSz="457200" rtl="0" eaLnBrk="1" fontAlgn="auto" latinLnBrk="0" hangingPunct="1">
+                        <a:lnSpc>
+                          <a:spcPct val="100000"/>
+                        </a:lnSpc>
+                        <a:spcBef>
+                          <a:spcPts val="0"/>
+                        </a:spcBef>
+                        <a:spcAft>
+                          <a:spcPts val="0"/>
+                        </a:spcAft>
+                        <a:buClrTx/>
+                        <a:buSzTx/>
+                        <a:buFontTx/>
+                        <a:buNone/>
+                        <a:tabLst/>
+                        <a:defRPr/>
+                      </a:pPr>
+                      <a:r>
+                        <a:rPr lang="en-US" sz="2800" dirty="0" smtClean="0"/>
+                        <a:t>Geolocation</a:t>
+                      </a:r>
+                    </a:p>
+                  </a:txBody>
+                  <a:tcPr>
+                    <a:solidFill>
+                      <a:srgbClr val="FFFF00">
+                        <a:alpha val="40000"/>
+                      </a:srgbClr>
+                    </a:solidFill>
+                  </a:tcPr>
+                </a:tc>
+              </a:tr>
+            </a:tbl>
+          </a:graphicData>
+        </a:graphic>
+      </p:graphicFrame>
     </p:spTree>
     <p:extLst>
       <p:ext uri="{BB962C8B-B14F-4D97-AF65-F5344CB8AC3E}">
-        <p14:creationId xmlns:p14="http://schemas.microsoft.com/office/powerpoint/2010/main" val="3759847043"/>
+        <p14:creationId xmlns:p14="http://schemas.microsoft.com/office/powerpoint/2010/main" val="1551616293"/>
       </p:ext>
     </p:extLst>
   </p:cSld>
   <p:clrMapOvr>
     <a:masterClrMapping/>
   </p:clrMapOvr>
+  <p:timing>
+    <p:tnLst>
+      <p:par>
+        <p:cTn id="1" dur="indefinite" restart="never" nodeType="tmRoot"/>
+      </p:par>
+    </p:tnLst>
+  </p:timing>
 </p:sld>
 </file>
 
-<file path=ppt/slides/slide11.xml><?xml version="1.0" encoding="utf-8"?>
+<file path=ppt/slides/slide3.xml><?xml version="1.0" encoding="utf-8"?>
 <p:sld xmlns:a="http://schemas.openxmlformats.org/drawingml/2006/main" xmlns:r="http://schemas.openxmlformats.org/officeDocument/2006/relationships" xmlns:p="http://schemas.openxmlformats.org/presentationml/2006/main">
   <p:cSld>
     <p:spTree>
@@ -4409,6 +5070,184 @@
           <a:p>
             <a:r>
               <a:rPr lang="en-US" dirty="0" smtClean="0"/>
+              <a:t>Geolocation</a:t>
+            </a:r>
+            <a:endParaRPr lang="en-US" dirty="0"/>
+          </a:p>
+        </p:txBody>
+      </p:sp>
+      <p:pic>
+        <p:nvPicPr>
+          <p:cNvPr id="4" name="Content Placeholder 3"/>
+          <p:cNvPicPr>
+            <a:picLocks noGrp="1" noChangeAspect="1"/>
+          </p:cNvPicPr>
+          <p:nvPr>
+            <p:ph idx="1"/>
+          </p:nvPr>
+        </p:nvPicPr>
+        <p:blipFill>
+          <a:blip r:embed="rId3"/>
+          <a:srcRect t="1337" b="1337"/>
+          <a:stretch>
+            <a:fillRect/>
+          </a:stretch>
+        </p:blipFill>
+        <p:spPr/>
+      </p:pic>
+    </p:spTree>
+    <p:extLst>
+      <p:ext uri="{BB962C8B-B14F-4D97-AF65-F5344CB8AC3E}">
+        <p14:creationId xmlns:p14="http://schemas.microsoft.com/office/powerpoint/2010/main" val="3363128827"/>
+      </p:ext>
+    </p:extLst>
+  </p:cSld>
+  <p:clrMapOvr>
+    <a:masterClrMapping/>
+  </p:clrMapOvr>
+</p:sld>
+</file>
+
+<file path=ppt/slides/slide4.xml><?xml version="1.0" encoding="utf-8"?>
+<p:sld xmlns:a="http://schemas.openxmlformats.org/drawingml/2006/main" xmlns:r="http://schemas.openxmlformats.org/officeDocument/2006/relationships" xmlns:p="http://schemas.openxmlformats.org/presentationml/2006/main">
+  <p:cSld>
+    <p:spTree>
+      <p:nvGrpSpPr>
+        <p:cNvPr id="1" name=""/>
+        <p:cNvGrpSpPr/>
+        <p:nvPr/>
+      </p:nvGrpSpPr>
+      <p:grpSpPr>
+        <a:xfrm>
+          <a:off x="0" y="0"/>
+          <a:ext cx="0" cy="0"/>
+          <a:chOff x="0" y="0"/>
+          <a:chExt cx="0" cy="0"/>
+        </a:xfrm>
+      </p:grpSpPr>
+      <p:sp>
+        <p:nvSpPr>
+          <p:cNvPr id="2" name="Title 1"/>
+          <p:cNvSpPr>
+            <a:spLocks noGrp="1"/>
+          </p:cNvSpPr>
+          <p:nvPr>
+            <p:ph type="title"/>
+          </p:nvPr>
+        </p:nvSpPr>
+        <p:spPr/>
+        <p:txBody>
+          <a:bodyPr/>
+          <a:lstStyle/>
+          <a:p>
+            <a:r>
+              <a:rPr lang="en-US" dirty="0" smtClean="0"/>
+              <a:t>Geolocation APIs</a:t>
+            </a:r>
+            <a:endParaRPr lang="en-US" dirty="0"/>
+          </a:p>
+        </p:txBody>
+      </p:sp>
+      <p:sp>
+        <p:nvSpPr>
+          <p:cNvPr id="3" name="Content Placeholder 2"/>
+          <p:cNvSpPr>
+            <a:spLocks noGrp="1"/>
+          </p:cNvSpPr>
+          <p:nvPr>
+            <p:ph idx="1"/>
+          </p:nvPr>
+        </p:nvSpPr>
+        <p:spPr/>
+        <p:txBody>
+          <a:bodyPr/>
+          <a:lstStyle/>
+          <a:p>
+            <a:pPr marL="0" indent="0">
+              <a:buNone/>
+            </a:pPr>
+            <a:r>
+              <a:rPr lang="en-US" dirty="0" smtClean="0"/>
+              <a:t>Information provided:</a:t>
+            </a:r>
+          </a:p>
+          <a:p>
+            <a:r>
+              <a:rPr lang="en-US" dirty="0" smtClean="0"/>
+              <a:t>Latitude and longitude</a:t>
+            </a:r>
+          </a:p>
+          <a:p>
+            <a:r>
+              <a:rPr lang="en-US" dirty="0" smtClean="0"/>
+              <a:t>Altitude</a:t>
+            </a:r>
+          </a:p>
+          <a:p>
+            <a:r>
+              <a:rPr lang="en-US" dirty="0" smtClean="0"/>
+              <a:t>Speed</a:t>
+            </a:r>
+          </a:p>
+          <a:p>
+            <a:r>
+              <a:rPr lang="en-US" dirty="0" smtClean="0"/>
+              <a:t>Heading</a:t>
+            </a:r>
+          </a:p>
+          <a:p>
+            <a:pPr lvl="1"/>
+            <a:endParaRPr lang="en-US" dirty="0"/>
+          </a:p>
+        </p:txBody>
+      </p:sp>
+    </p:spTree>
+    <p:extLst>
+      <p:ext uri="{BB962C8B-B14F-4D97-AF65-F5344CB8AC3E}">
+        <p14:creationId xmlns:p14="http://schemas.microsoft.com/office/powerpoint/2010/main" val="3759847043"/>
+      </p:ext>
+    </p:extLst>
+  </p:cSld>
+  <p:clrMapOvr>
+    <a:masterClrMapping/>
+  </p:clrMapOvr>
+</p:sld>
+</file>
+
+<file path=ppt/slides/slide5.xml><?xml version="1.0" encoding="utf-8"?>
+<p:sld xmlns:a="http://schemas.openxmlformats.org/drawingml/2006/main" xmlns:r="http://schemas.openxmlformats.org/officeDocument/2006/relationships" xmlns:p="http://schemas.openxmlformats.org/presentationml/2006/main">
+  <p:cSld>
+    <p:spTree>
+      <p:nvGrpSpPr>
+        <p:cNvPr id="1" name=""/>
+        <p:cNvGrpSpPr/>
+        <p:nvPr/>
+      </p:nvGrpSpPr>
+      <p:grpSpPr>
+        <a:xfrm>
+          <a:off x="0" y="0"/>
+          <a:ext cx="0" cy="0"/>
+          <a:chOff x="0" y="0"/>
+          <a:chExt cx="0" cy="0"/>
+        </a:xfrm>
+      </p:grpSpPr>
+      <p:sp>
+        <p:nvSpPr>
+          <p:cNvPr id="2" name="Title 1"/>
+          <p:cNvSpPr>
+            <a:spLocks noGrp="1"/>
+          </p:cNvSpPr>
+          <p:nvPr>
+            <p:ph type="title"/>
+          </p:nvPr>
+        </p:nvSpPr>
+        <p:spPr/>
+        <p:txBody>
+          <a:bodyPr/>
+          <a:lstStyle/>
+          <a:p>
+            <a:r>
+              <a:rPr lang="en-US" dirty="0" smtClean="0"/>
               <a:t>Location Data Sources</a:t>
             </a:r>
             <a:endParaRPr lang="en-US" dirty="0"/>
@@ -4432,7 +5271,7 @@
         </p:nvGraphicFramePr>
         <p:xfrm>
           <a:off x="457200" y="2235146"/>
-          <a:ext cx="8229600" cy="2499359"/>
+          <a:ext cx="8229600" cy="2499360"/>
         </p:xfrm>
         <a:graphic>
           <a:graphicData uri="http://schemas.openxmlformats.org/drawingml/2006/table">
@@ -4654,7 +5493,7 @@
 </p:sld>
 </file>
 
-<file path=ppt/slides/slide12.xml><?xml version="1.0" encoding="utf-8"?>
+<file path=ppt/slides/slide6.xml><?xml version="1.0" encoding="utf-8"?>
 <p:sld xmlns:a="http://schemas.openxmlformats.org/drawingml/2006/main" xmlns:r="http://schemas.openxmlformats.org/officeDocument/2006/relationships" xmlns:p="http://schemas.openxmlformats.org/presentationml/2006/main">
   <p:cSld>
     <p:spTree>
@@ -4803,7 +5642,7 @@
 </p:sld>
 </file>
 
-<file path=ppt/slides/slide13.xml><?xml version="1.0" encoding="utf-8"?>
+<file path=ppt/slides/slide7.xml><?xml version="1.0" encoding="utf-8"?>
 <p:sld xmlns:a="http://schemas.openxmlformats.org/drawingml/2006/main" xmlns:r="http://schemas.openxmlformats.org/officeDocument/2006/relationships" xmlns:p="http://schemas.openxmlformats.org/presentationml/2006/main">
   <p:cSld>
     <p:spTree>
@@ -5181,1612 +6020,6 @@
 </p:sld>
 </file>
 
-<file path=ppt/slides/slide14.xml><?xml version="1.0" encoding="utf-8"?>
-<p:sld xmlns:a="http://schemas.openxmlformats.org/drawingml/2006/main" xmlns:r="http://schemas.openxmlformats.org/officeDocument/2006/relationships" xmlns:p="http://schemas.openxmlformats.org/presentationml/2006/main">
-  <p:cSld>
-    <p:spTree>
-      <p:nvGrpSpPr>
-        <p:cNvPr id="1" name=""/>
-        <p:cNvGrpSpPr/>
-        <p:nvPr/>
-      </p:nvGrpSpPr>
-      <p:grpSpPr>
-        <a:xfrm>
-          <a:off x="0" y="0"/>
-          <a:ext cx="0" cy="0"/>
-          <a:chOff x="0" y="0"/>
-          <a:chExt cx="0" cy="0"/>
-        </a:xfrm>
-      </p:grpSpPr>
-      <p:sp>
-        <p:nvSpPr>
-          <p:cNvPr id="2" name="Title 1"/>
-          <p:cNvSpPr>
-            <a:spLocks noGrp="1"/>
-          </p:cNvSpPr>
-          <p:nvPr>
-            <p:ph type="title"/>
-          </p:nvPr>
-        </p:nvSpPr>
-        <p:spPr/>
-        <p:txBody>
-          <a:bodyPr/>
-          <a:lstStyle/>
-          <a:p>
-            <a:r>
-              <a:rPr lang="en-US" dirty="0" smtClean="0"/>
-              <a:t>Fused Location Provider</a:t>
-            </a:r>
-            <a:endParaRPr lang="en-US" dirty="0"/>
-          </a:p>
-        </p:txBody>
-      </p:sp>
-      <p:sp>
-        <p:nvSpPr>
-          <p:cNvPr id="3" name="Content Placeholder 2"/>
-          <p:cNvSpPr>
-            <a:spLocks noGrp="1"/>
-          </p:cNvSpPr>
-          <p:nvPr>
-            <p:ph idx="1"/>
-          </p:nvPr>
-        </p:nvSpPr>
-        <p:spPr/>
-        <p:txBody>
-          <a:bodyPr>
-            <a:normAutofit fontScale="92500" lnSpcReduction="20000"/>
-          </a:bodyPr>
-          <a:lstStyle/>
-          <a:p>
-            <a:r>
-              <a:rPr lang="en-US" dirty="0" smtClean="0"/>
-              <a:t>Gets the best available provider</a:t>
-            </a:r>
-          </a:p>
-          <a:p>
-            <a:r>
-              <a:rPr lang="en-US" dirty="0" smtClean="0"/>
-              <a:t>Provides last known location (usually current)</a:t>
-            </a:r>
-          </a:p>
-          <a:p>
-            <a:r>
-              <a:rPr lang="en-US" dirty="0" smtClean="0"/>
-              <a:t>Provides continuous location updates</a:t>
-            </a:r>
-          </a:p>
-          <a:p>
-            <a:r>
-              <a:rPr lang="en-US" dirty="0" smtClean="0"/>
-              <a:t> Location client</a:t>
-            </a:r>
-          </a:p>
-          <a:p>
-            <a:pPr lvl="1"/>
-            <a:r>
-              <a:rPr lang="en-US" dirty="0" smtClean="0"/>
-              <a:t>Connects to Google Play Services</a:t>
-            </a:r>
-          </a:p>
-          <a:p>
-            <a:pPr lvl="1"/>
-            <a:r>
-              <a:rPr lang="en-US" dirty="0" smtClean="0"/>
-              <a:t>Developer needs to implement interfaces for callbacks</a:t>
-            </a:r>
-          </a:p>
-          <a:p>
-            <a:pPr lvl="1"/>
-            <a:endParaRPr lang="en-US" dirty="0"/>
-          </a:p>
-        </p:txBody>
-      </p:sp>
-    </p:spTree>
-    <p:extLst>
-      <p:ext uri="{BB962C8B-B14F-4D97-AF65-F5344CB8AC3E}">
-        <p14:creationId xmlns:p14="http://schemas.microsoft.com/office/powerpoint/2010/main" val="418407440"/>
-      </p:ext>
-    </p:extLst>
-  </p:cSld>
-  <p:clrMapOvr>
-    <a:masterClrMapping/>
-  </p:clrMapOvr>
-</p:sld>
-</file>
-
-<file path=ppt/slides/slide15.xml><?xml version="1.0" encoding="utf-8"?>
-<p:sld xmlns:a="http://schemas.openxmlformats.org/drawingml/2006/main" xmlns:r="http://schemas.openxmlformats.org/officeDocument/2006/relationships" xmlns:p="http://schemas.openxmlformats.org/presentationml/2006/main">
-  <p:cSld>
-    <p:spTree>
-      <p:nvGrpSpPr>
-        <p:cNvPr id="1" name=""/>
-        <p:cNvGrpSpPr/>
-        <p:nvPr/>
-      </p:nvGrpSpPr>
-      <p:grpSpPr>
-        <a:xfrm>
-          <a:off x="0" y="0"/>
-          <a:ext cx="0" cy="0"/>
-          <a:chOff x="0" y="0"/>
-          <a:chExt cx="0" cy="0"/>
-        </a:xfrm>
-      </p:grpSpPr>
-      <p:sp>
-        <p:nvSpPr>
-          <p:cNvPr id="2" name="Title 1"/>
-          <p:cNvSpPr>
-            <a:spLocks noGrp="1"/>
-          </p:cNvSpPr>
-          <p:nvPr>
-            <p:ph type="title"/>
-          </p:nvPr>
-        </p:nvSpPr>
-        <p:spPr/>
-        <p:txBody>
-          <a:bodyPr/>
-          <a:lstStyle/>
-          <a:p>
-            <a:r>
-              <a:rPr lang="en-US" dirty="0" smtClean="0"/>
-              <a:t>Related APIs</a:t>
-            </a:r>
-            <a:endParaRPr lang="en-US" dirty="0"/>
-          </a:p>
-        </p:txBody>
-      </p:sp>
-      <p:sp>
-        <p:nvSpPr>
-          <p:cNvPr id="3" name="Content Placeholder 2"/>
-          <p:cNvSpPr>
-            <a:spLocks noGrp="1"/>
-          </p:cNvSpPr>
-          <p:nvPr>
-            <p:ph idx="1"/>
-          </p:nvPr>
-        </p:nvSpPr>
-        <p:spPr/>
-        <p:txBody>
-          <a:bodyPr>
-            <a:normAutofit fontScale="92500" lnSpcReduction="20000"/>
-          </a:bodyPr>
-          <a:lstStyle/>
-          <a:p>
-            <a:r>
-              <a:rPr lang="en-US" dirty="0" smtClean="0"/>
-              <a:t>Geocoder</a:t>
-            </a:r>
-          </a:p>
-          <a:p>
-            <a:pPr lvl="1"/>
-            <a:r>
-              <a:rPr lang="en-US" dirty="0" smtClean="0"/>
-              <a:t>Get address from latitude and longitude</a:t>
-            </a:r>
-          </a:p>
-          <a:p>
-            <a:pPr lvl="1"/>
-            <a:r>
-              <a:rPr lang="en-US" dirty="0" smtClean="0"/>
-              <a:t>Get latitude and longitude from address</a:t>
-            </a:r>
-          </a:p>
-          <a:p>
-            <a:r>
-              <a:rPr lang="en-US" dirty="0" smtClean="0"/>
-              <a:t>Geofencing</a:t>
-            </a:r>
-          </a:p>
-          <a:p>
-            <a:pPr lvl="1"/>
-            <a:r>
-              <a:rPr lang="en-US" dirty="0" smtClean="0"/>
-              <a:t>Monitor distance from a point of interest</a:t>
-            </a:r>
-          </a:p>
-          <a:p>
-            <a:pPr lvl="1"/>
-            <a:r>
-              <a:rPr lang="en-US" dirty="0" smtClean="0"/>
-              <a:t>Get notifications when entering or leaving area of interest</a:t>
-            </a:r>
-            <a:endParaRPr lang="en-US" dirty="0"/>
-          </a:p>
-        </p:txBody>
-      </p:sp>
-    </p:spTree>
-    <p:extLst>
-      <p:ext uri="{BB962C8B-B14F-4D97-AF65-F5344CB8AC3E}">
-        <p14:creationId xmlns:p14="http://schemas.microsoft.com/office/powerpoint/2010/main" val="326238305"/>
-      </p:ext>
-    </p:extLst>
-  </p:cSld>
-  <p:clrMapOvr>
-    <a:masterClrMapping/>
-  </p:clrMapOvr>
-</p:sld>
-</file>
-
-<file path=ppt/slides/slide2.xml><?xml version="1.0" encoding="utf-8"?>
-<p:sld xmlns:a="http://schemas.openxmlformats.org/drawingml/2006/main" xmlns:r="http://schemas.openxmlformats.org/officeDocument/2006/relationships" xmlns:p="http://schemas.openxmlformats.org/presentationml/2006/main">
-  <p:cSld>
-    <p:spTree>
-      <p:nvGrpSpPr>
-        <p:cNvPr id="1" name=""/>
-        <p:cNvGrpSpPr/>
-        <p:nvPr/>
-      </p:nvGrpSpPr>
-      <p:grpSpPr>
-        <a:xfrm>
-          <a:off x="0" y="0"/>
-          <a:ext cx="0" cy="0"/>
-          <a:chOff x="0" y="0"/>
-          <a:chExt cx="0" cy="0"/>
-        </a:xfrm>
-      </p:grpSpPr>
-      <p:sp>
-        <p:nvSpPr>
-          <p:cNvPr id="6" name="Title 5"/>
-          <p:cNvSpPr>
-            <a:spLocks noGrp="1"/>
-          </p:cNvSpPr>
-          <p:nvPr>
-            <p:ph type="title"/>
-          </p:nvPr>
-        </p:nvSpPr>
-        <p:spPr/>
-        <p:txBody>
-          <a:bodyPr>
-            <a:normAutofit/>
-          </a:bodyPr>
-          <a:lstStyle/>
-          <a:p>
-            <a:r>
-              <a:rPr lang="en-US" dirty="0" smtClean="0"/>
-              <a:t>Course Schedule</a:t>
-            </a:r>
-            <a:endParaRPr lang="en-US" dirty="0"/>
-          </a:p>
-        </p:txBody>
-      </p:sp>
-      <p:graphicFrame>
-        <p:nvGraphicFramePr>
-          <p:cNvPr id="5" name="Content Placeholder 4"/>
-          <p:cNvGraphicFramePr>
-            <a:graphicFrameLocks noGrp="1"/>
-          </p:cNvGraphicFramePr>
-          <p:nvPr>
-            <p:ph sz="half" idx="1"/>
-            <p:extLst>
-              <p:ext uri="{D42A27DB-BD31-4B8C-83A1-F6EECF244321}">
-                <p14:modId xmlns:p14="http://schemas.microsoft.com/office/powerpoint/2010/main" val="987645139"/>
-              </p:ext>
-            </p:extLst>
-          </p:nvPr>
-        </p:nvGraphicFramePr>
-        <p:xfrm>
-          <a:off x="356277" y="2033752"/>
-          <a:ext cx="3991801" cy="4298237"/>
-        </p:xfrm>
-        <a:graphic>
-          <a:graphicData uri="http://schemas.openxmlformats.org/drawingml/2006/table">
-            <a:tbl>
-              <a:tblPr firstRow="1" bandRow="1">
-                <a:tableStyleId>{775DCB02-9BB8-47FD-8907-85C794F793BA}</a:tableStyleId>
-              </a:tblPr>
-              <a:tblGrid>
-                <a:gridCol w="511701"/>
-                <a:gridCol w="3480100"/>
-              </a:tblGrid>
-              <a:tr h="427278">
-                <a:tc>
-                  <a:txBody>
-                    <a:bodyPr/>
-                    <a:lstStyle/>
-                    <a:p>
-                      <a:r>
-                        <a:rPr lang="en-US" dirty="0" smtClean="0"/>
-                        <a:t>Wk</a:t>
-                      </a:r>
-                      <a:endParaRPr lang="en-US" dirty="0"/>
-                    </a:p>
-                  </a:txBody>
-                  <a:tcPr/>
-                </a:tc>
-                <a:tc>
-                  <a:txBody>
-                    <a:bodyPr/>
-                    <a:lstStyle/>
-                    <a:p>
-                      <a:r>
-                        <a:rPr lang="en-US" dirty="0" smtClean="0"/>
-                        <a:t>Topic</a:t>
-                      </a:r>
-                      <a:endParaRPr lang="en-US" dirty="0"/>
-                    </a:p>
-                  </a:txBody>
-                  <a:tcPr/>
-                </a:tc>
-              </a:tr>
-              <a:tr h="942660">
-                <a:tc>
-                  <a:txBody>
-                    <a:bodyPr/>
-                    <a:lstStyle/>
-                    <a:p>
-                      <a:r>
-                        <a:rPr lang="en-US" sz="2800" dirty="0" smtClean="0"/>
-                        <a:t>1</a:t>
-                      </a:r>
-                      <a:endParaRPr lang="en-US" sz="2800" dirty="0"/>
-                    </a:p>
-                  </a:txBody>
-                  <a:tcPr/>
-                </a:tc>
-                <a:tc>
-                  <a:txBody>
-                    <a:bodyPr/>
-                    <a:lstStyle/>
-                    <a:p>
-                      <a:pPr marL="0" marR="0" indent="0" algn="l" defTabSz="457200" rtl="0" eaLnBrk="1" fontAlgn="auto" latinLnBrk="0" hangingPunct="1">
-                        <a:lnSpc>
-                          <a:spcPct val="100000"/>
-                        </a:lnSpc>
-                        <a:spcBef>
-                          <a:spcPts val="0"/>
-                        </a:spcBef>
-                        <a:spcAft>
-                          <a:spcPts val="0"/>
-                        </a:spcAft>
-                        <a:buClrTx/>
-                        <a:buSzTx/>
-                        <a:buFontTx/>
-                        <a:buNone/>
-                        <a:tabLst/>
-                        <a:defRPr/>
-                      </a:pPr>
-                      <a:r>
-                        <a:rPr lang="en-US" sz="2800" dirty="0" smtClean="0"/>
-                        <a:t>Intro</a:t>
-                      </a:r>
-                      <a:r>
-                        <a:rPr lang="en-US" sz="2800" baseline="0" dirty="0" smtClean="0"/>
-                        <a:t> +</a:t>
-                      </a:r>
-                      <a:r>
-                        <a:rPr lang="en-US" sz="2800" dirty="0" smtClean="0"/>
-                        <a:t> single-screen apps</a:t>
-                      </a:r>
-                    </a:p>
-                  </a:txBody>
-                  <a:tcPr/>
-                </a:tc>
-              </a:tr>
-              <a:tr h="942660">
-                <a:tc>
-                  <a:txBody>
-                    <a:bodyPr/>
-                    <a:lstStyle/>
-                    <a:p>
-                      <a:r>
-                        <a:rPr lang="en-US" sz="2800" dirty="0" smtClean="0"/>
-                        <a:t>2</a:t>
-                      </a:r>
-                      <a:endParaRPr lang="en-US" sz="2800" dirty="0"/>
-                    </a:p>
-                  </a:txBody>
-                  <a:tcPr>
-                    <a:noFill/>
-                  </a:tcPr>
-                </a:tc>
-                <a:tc>
-                  <a:txBody>
-                    <a:bodyPr/>
-                    <a:lstStyle/>
-                    <a:p>
-                      <a:pPr marL="0" marR="0" indent="0" algn="l" defTabSz="457200" rtl="0" eaLnBrk="1" fontAlgn="auto" latinLnBrk="0" hangingPunct="1">
-                        <a:lnSpc>
-                          <a:spcPct val="100000"/>
-                        </a:lnSpc>
-                        <a:spcBef>
-                          <a:spcPts val="0"/>
-                        </a:spcBef>
-                        <a:spcAft>
-                          <a:spcPts val="0"/>
-                        </a:spcAft>
-                        <a:buClrTx/>
-                        <a:buSzTx/>
-                        <a:buFontTx/>
-                        <a:buNone/>
-                        <a:tabLst/>
-                        <a:defRPr/>
-                      </a:pPr>
-                      <a:r>
-                        <a:rPr lang="en-US" sz="2800" dirty="0" smtClean="0"/>
-                        <a:t>Multi-screen (multi-activity) apps</a:t>
-                      </a:r>
-                    </a:p>
-                  </a:txBody>
-                  <a:tcPr>
-                    <a:noFill/>
-                  </a:tcPr>
-                </a:tc>
-              </a:tr>
-              <a:tr h="942660">
-                <a:tc>
-                  <a:txBody>
-                    <a:bodyPr/>
-                    <a:lstStyle/>
-                    <a:p>
-                      <a:r>
-                        <a:rPr lang="en-US" sz="2800" dirty="0" smtClean="0"/>
-                        <a:t>3</a:t>
-                      </a:r>
-                      <a:endParaRPr lang="en-US" sz="2800" dirty="0"/>
-                    </a:p>
-                  </a:txBody>
-                  <a:tcPr>
-                    <a:solidFill>
-                      <a:schemeClr val="accent4">
-                        <a:alpha val="40000"/>
-                      </a:schemeClr>
-                    </a:solidFill>
-                  </a:tcPr>
-                </a:tc>
-                <a:tc>
-                  <a:txBody>
-                    <a:bodyPr/>
-                    <a:lstStyle/>
-                    <a:p>
-                      <a:pPr marL="0" marR="0" indent="0" algn="l" defTabSz="457200" rtl="0" eaLnBrk="1" fontAlgn="auto" latinLnBrk="0" hangingPunct="1">
-                        <a:lnSpc>
-                          <a:spcPct val="100000"/>
-                        </a:lnSpc>
-                        <a:spcBef>
-                          <a:spcPts val="0"/>
-                        </a:spcBef>
-                        <a:spcAft>
-                          <a:spcPts val="0"/>
-                        </a:spcAft>
-                        <a:buClrTx/>
-                        <a:buSzTx/>
-                        <a:buFontTx/>
-                        <a:buNone/>
-                        <a:tabLst/>
-                        <a:defRPr/>
-                      </a:pPr>
-                      <a:r>
-                        <a:rPr lang="en-US" sz="2800" dirty="0" smtClean="0"/>
-                        <a:t>Activity lifecycle</a:t>
-                      </a:r>
-                      <a:r>
-                        <a:rPr lang="en-US" sz="2800" baseline="0" dirty="0" smtClean="0"/>
-                        <a:t> and state</a:t>
-                      </a:r>
-                      <a:endParaRPr lang="en-US" sz="2800" dirty="0" smtClean="0"/>
-                    </a:p>
-                  </a:txBody>
-                  <a:tcPr>
-                    <a:solidFill>
-                      <a:schemeClr val="accent4">
-                        <a:alpha val="40000"/>
-                      </a:schemeClr>
-                    </a:solidFill>
-                  </a:tcPr>
-                </a:tc>
-              </a:tr>
-              <a:tr h="516942">
-                <a:tc>
-                  <a:txBody>
-                    <a:bodyPr/>
-                    <a:lstStyle/>
-                    <a:p>
-                      <a:r>
-                        <a:rPr lang="en-US" sz="2800" dirty="0" smtClean="0"/>
-                        <a:t>4</a:t>
-                      </a:r>
-                      <a:endParaRPr lang="en-US" sz="2800" dirty="0"/>
-                    </a:p>
-                  </a:txBody>
-                  <a:tcPr>
-                    <a:noFill/>
-                  </a:tcPr>
-                </a:tc>
-                <a:tc>
-                  <a:txBody>
-                    <a:bodyPr/>
-                    <a:lstStyle/>
-                    <a:p>
-                      <a:pPr marL="0" marR="0" indent="0" algn="l" defTabSz="457200" rtl="0" eaLnBrk="1" fontAlgn="auto" latinLnBrk="0" hangingPunct="1">
-                        <a:lnSpc>
-                          <a:spcPct val="100000"/>
-                        </a:lnSpc>
-                        <a:spcBef>
-                          <a:spcPts val="0"/>
-                        </a:spcBef>
-                        <a:spcAft>
-                          <a:spcPts val="0"/>
-                        </a:spcAft>
-                        <a:buClrTx/>
-                        <a:buSzTx/>
-                        <a:buFontTx/>
-                        <a:buNone/>
-                        <a:tabLst/>
-                        <a:defRPr/>
-                      </a:pPr>
-                      <a:r>
-                        <a:rPr lang="en-US" sz="2800" dirty="0" smtClean="0"/>
-                        <a:t>List</a:t>
-                      </a:r>
-                      <a:r>
-                        <a:rPr lang="en-US" sz="2800" baseline="0" dirty="0" smtClean="0"/>
-                        <a:t> Views + Adapters</a:t>
-                      </a:r>
-                      <a:endParaRPr lang="en-US" sz="2800" dirty="0" smtClean="0"/>
-                    </a:p>
-                  </a:txBody>
-                  <a:tcPr>
-                    <a:noFill/>
-                  </a:tcPr>
-                </a:tc>
-              </a:tr>
-              <a:tr h="516942">
-                <a:tc>
-                  <a:txBody>
-                    <a:bodyPr/>
-                    <a:lstStyle/>
-                    <a:p>
-                      <a:r>
-                        <a:rPr lang="en-US" sz="2800" dirty="0" smtClean="0"/>
-                        <a:t>5</a:t>
-                      </a:r>
-                      <a:endParaRPr lang="en-US" sz="2800" dirty="0"/>
-                    </a:p>
-                  </a:txBody>
-                  <a:tcPr>
-                    <a:solidFill>
-                      <a:schemeClr val="accent4">
-                        <a:alpha val="40000"/>
-                      </a:schemeClr>
-                    </a:solidFill>
-                  </a:tcPr>
-                </a:tc>
-                <a:tc>
-                  <a:txBody>
-                    <a:bodyPr/>
-                    <a:lstStyle/>
-                    <a:p>
-                      <a:pPr marL="0" marR="0" indent="0" algn="l" defTabSz="457200" rtl="0" eaLnBrk="1" fontAlgn="auto" latinLnBrk="0" hangingPunct="1">
-                        <a:lnSpc>
-                          <a:spcPct val="100000"/>
-                        </a:lnSpc>
-                        <a:spcBef>
-                          <a:spcPts val="0"/>
-                        </a:spcBef>
-                        <a:spcAft>
-                          <a:spcPts val="0"/>
-                        </a:spcAft>
-                        <a:buClrTx/>
-                        <a:buSzTx/>
-                        <a:buFontTx/>
-                        <a:buNone/>
-                        <a:tabLst/>
-                        <a:defRPr/>
-                      </a:pPr>
-                      <a:r>
-                        <a:rPr lang="en-US" sz="2800" dirty="0" smtClean="0"/>
-                        <a:t>Layouts + </a:t>
-                      </a:r>
-                      <a:r>
-                        <a:rPr lang="en-US" sz="2800" baseline="0" dirty="0" smtClean="0"/>
-                        <a:t>orientation</a:t>
-                      </a:r>
-                      <a:endParaRPr lang="en-US" sz="2800" dirty="0" smtClean="0"/>
-                    </a:p>
-                  </a:txBody>
-                  <a:tcPr>
-                    <a:solidFill>
-                      <a:schemeClr val="accent4">
-                        <a:alpha val="40000"/>
-                      </a:schemeClr>
-                    </a:solidFill>
-                  </a:tcPr>
-                </a:tc>
-              </a:tr>
-            </a:tbl>
-          </a:graphicData>
-        </a:graphic>
-      </p:graphicFrame>
-      <p:graphicFrame>
-        <p:nvGraphicFramePr>
-          <p:cNvPr id="8" name="Content Placeholder 7"/>
-          <p:cNvGraphicFramePr>
-            <a:graphicFrameLocks noGrp="1"/>
-          </p:cNvGraphicFramePr>
-          <p:nvPr>
-            <p:ph sz="half" idx="2"/>
-            <p:extLst>
-              <p:ext uri="{D42A27DB-BD31-4B8C-83A1-F6EECF244321}">
-                <p14:modId xmlns:p14="http://schemas.microsoft.com/office/powerpoint/2010/main" val="2604810962"/>
-              </p:ext>
-            </p:extLst>
-          </p:nvPr>
-        </p:nvGraphicFramePr>
-        <p:xfrm>
-          <a:off x="4507872" y="2033752"/>
-          <a:ext cx="4297617" cy="4289142"/>
-        </p:xfrm>
-        <a:graphic>
-          <a:graphicData uri="http://schemas.openxmlformats.org/drawingml/2006/table">
-            <a:tbl>
-              <a:tblPr firstRow="1" bandRow="1">
-                <a:tableStyleId>{775DCB02-9BB8-47FD-8907-85C794F793BA}</a:tableStyleId>
-              </a:tblPr>
-              <a:tblGrid>
-                <a:gridCol w="546664"/>
-                <a:gridCol w="3750953"/>
-              </a:tblGrid>
-              <a:tr h="318056">
-                <a:tc>
-                  <a:txBody>
-                    <a:bodyPr/>
-                    <a:lstStyle/>
-                    <a:p>
-                      <a:r>
-                        <a:rPr lang="en-US" dirty="0" smtClean="0"/>
-                        <a:t>Wk</a:t>
-                      </a:r>
-                      <a:endParaRPr lang="en-US" dirty="0"/>
-                    </a:p>
-                  </a:txBody>
-                  <a:tcPr/>
-                </a:tc>
-                <a:tc>
-                  <a:txBody>
-                    <a:bodyPr/>
-                    <a:lstStyle/>
-                    <a:p>
-                      <a:r>
-                        <a:rPr lang="en-US" dirty="0" smtClean="0"/>
-                        <a:t>Topic</a:t>
-                      </a:r>
-                      <a:endParaRPr lang="en-US" dirty="0"/>
-                    </a:p>
-                  </a:txBody>
-                  <a:tcPr/>
-                </a:tc>
-              </a:tr>
-              <a:tr h="957676">
-                <a:tc>
-                  <a:txBody>
-                    <a:bodyPr/>
-                    <a:lstStyle/>
-                    <a:p>
-                      <a:r>
-                        <a:rPr lang="en-US" sz="2800" dirty="0" smtClean="0"/>
-                        <a:t>6</a:t>
-                      </a:r>
-                      <a:endParaRPr lang="en-US" sz="2800" dirty="0"/>
-                    </a:p>
-                  </a:txBody>
-                  <a:tcPr>
-                    <a:solidFill>
-                      <a:schemeClr val="accent4">
-                        <a:alpha val="40000"/>
-                      </a:schemeClr>
-                    </a:solidFill>
-                  </a:tcPr>
-                </a:tc>
-                <a:tc>
-                  <a:txBody>
-                    <a:bodyPr/>
-                    <a:lstStyle/>
-                    <a:p>
-                      <a:pPr marL="0" marR="0" indent="0" algn="l" defTabSz="457200" rtl="0" eaLnBrk="1" fontAlgn="auto" latinLnBrk="0" hangingPunct="1">
-                        <a:lnSpc>
-                          <a:spcPct val="100000"/>
-                        </a:lnSpc>
-                        <a:spcBef>
-                          <a:spcPts val="0"/>
-                        </a:spcBef>
-                        <a:spcAft>
-                          <a:spcPts val="0"/>
-                        </a:spcAft>
-                        <a:buClrTx/>
-                        <a:buSzTx/>
-                        <a:buFontTx/>
-                        <a:buNone/>
-                        <a:tabLst/>
-                        <a:defRPr/>
-                      </a:pPr>
-                      <a:r>
-                        <a:rPr lang="en-US" sz="2800" dirty="0" smtClean="0"/>
-                        <a:t>Adapting to size and orientation: fragments</a:t>
-                      </a:r>
-                    </a:p>
-                  </a:txBody>
-                  <a:tcPr>
-                    <a:solidFill>
-                      <a:schemeClr val="accent4">
-                        <a:alpha val="40000"/>
-                      </a:schemeClr>
-                    </a:solidFill>
-                  </a:tcPr>
-                </a:tc>
-              </a:tr>
-              <a:tr h="525177">
-                <a:tc>
-                  <a:txBody>
-                    <a:bodyPr/>
-                    <a:lstStyle/>
-                    <a:p>
-                      <a:r>
-                        <a:rPr lang="en-US" sz="2800" dirty="0" smtClean="0"/>
-                        <a:t>7</a:t>
-                      </a:r>
-                      <a:endParaRPr lang="en-US" sz="2800" dirty="0"/>
-                    </a:p>
-                  </a:txBody>
-                  <a:tcPr>
-                    <a:solidFill>
-                      <a:schemeClr val="tx2">
-                        <a:alpha val="40000"/>
-                      </a:schemeClr>
-                    </a:solidFill>
-                  </a:tcPr>
-                </a:tc>
-                <a:tc>
-                  <a:txBody>
-                    <a:bodyPr/>
-                    <a:lstStyle/>
-                    <a:p>
-                      <a:pPr marL="0" marR="0" indent="0" algn="l" defTabSz="457200" rtl="0" eaLnBrk="1" fontAlgn="auto" latinLnBrk="0" hangingPunct="1">
-                        <a:lnSpc>
-                          <a:spcPct val="100000"/>
-                        </a:lnSpc>
-                        <a:spcBef>
-                          <a:spcPts val="0"/>
-                        </a:spcBef>
-                        <a:spcAft>
-                          <a:spcPts val="0"/>
-                        </a:spcAft>
-                        <a:buClrTx/>
-                        <a:buSzTx/>
-                        <a:buFontTx/>
-                        <a:buNone/>
-                        <a:tabLst/>
-                        <a:defRPr/>
-                      </a:pPr>
-                      <a:r>
-                        <a:rPr lang="en-US" sz="2800" dirty="0" smtClean="0"/>
-                        <a:t>Managing data: SQLite</a:t>
-                      </a:r>
-                    </a:p>
-                  </a:txBody>
-                  <a:tcPr>
-                    <a:solidFill>
-                      <a:schemeClr val="tx2">
-                        <a:alpha val="40000"/>
-                      </a:schemeClr>
-                    </a:solidFill>
-                  </a:tcPr>
-                </a:tc>
-              </a:tr>
-              <a:tr h="957676">
-                <a:tc>
-                  <a:txBody>
-                    <a:bodyPr/>
-                    <a:lstStyle/>
-                    <a:p>
-                      <a:r>
-                        <a:rPr lang="en-US" sz="2800" dirty="0" smtClean="0"/>
-                        <a:t>8</a:t>
-                      </a:r>
-                      <a:endParaRPr lang="en-US" sz="2800" dirty="0"/>
-                    </a:p>
-                  </a:txBody>
-                  <a:tcPr>
-                    <a:solidFill>
-                      <a:schemeClr val="accent4">
-                        <a:alpha val="40000"/>
-                      </a:schemeClr>
-                    </a:solidFill>
-                  </a:tcPr>
-                </a:tc>
-                <a:tc>
-                  <a:txBody>
-                    <a:bodyPr/>
-                    <a:lstStyle/>
-                    <a:p>
-                      <a:pPr marL="0" marR="0" indent="0" algn="l" defTabSz="457200" rtl="0" eaLnBrk="1" fontAlgn="auto" latinLnBrk="0" hangingPunct="1">
-                        <a:lnSpc>
-                          <a:spcPct val="100000"/>
-                        </a:lnSpc>
-                        <a:spcBef>
-                          <a:spcPts val="0"/>
-                        </a:spcBef>
-                        <a:spcAft>
-                          <a:spcPts val="0"/>
-                        </a:spcAft>
-                        <a:buClrTx/>
-                        <a:buSzTx/>
-                        <a:buFontTx/>
-                        <a:buNone/>
-                        <a:tabLst/>
-                        <a:defRPr/>
-                      </a:pPr>
-                      <a:r>
-                        <a:rPr lang="en-US" sz="2800" dirty="0" smtClean="0"/>
-                        <a:t>Consuming web services</a:t>
-                      </a:r>
-                    </a:p>
-                  </a:txBody>
-                  <a:tcPr>
-                    <a:solidFill>
-                      <a:schemeClr val="accent4">
-                        <a:alpha val="40000"/>
-                      </a:schemeClr>
-                    </a:solidFill>
-                  </a:tcPr>
-                </a:tc>
-              </a:tr>
-              <a:tr h="525177">
-                <a:tc>
-                  <a:txBody>
-                    <a:bodyPr/>
-                    <a:lstStyle/>
-                    <a:p>
-                      <a:r>
-                        <a:rPr lang="en-US" sz="2800" dirty="0" smtClean="0"/>
-                        <a:t>9</a:t>
-                      </a:r>
-                      <a:endParaRPr lang="en-US" sz="2800" dirty="0"/>
-                    </a:p>
-                  </a:txBody>
-                  <a:tcPr>
-                    <a:solidFill>
-                      <a:srgbClr val="FFFF00">
-                        <a:alpha val="40000"/>
-                      </a:srgbClr>
-                    </a:solidFill>
-                  </a:tcPr>
-                </a:tc>
-                <a:tc>
-                  <a:txBody>
-                    <a:bodyPr/>
-                    <a:lstStyle/>
-                    <a:p>
-                      <a:pPr marL="0" marR="0" indent="0" algn="l" defTabSz="457200" rtl="0" eaLnBrk="1" fontAlgn="auto" latinLnBrk="0" hangingPunct="1">
-                        <a:lnSpc>
-                          <a:spcPct val="100000"/>
-                        </a:lnSpc>
-                        <a:spcBef>
-                          <a:spcPts val="0"/>
-                        </a:spcBef>
-                        <a:spcAft>
-                          <a:spcPts val="0"/>
-                        </a:spcAft>
-                        <a:buClrTx/>
-                        <a:buSzTx/>
-                        <a:buFontTx/>
-                        <a:buNone/>
-                        <a:tabLst/>
-                        <a:defRPr/>
-                      </a:pPr>
-                      <a:r>
-                        <a:rPr lang="en-US" sz="2800" dirty="0" smtClean="0"/>
-                        <a:t>Geolocation</a:t>
-                      </a:r>
-                    </a:p>
-                  </a:txBody>
-                  <a:tcPr>
-                    <a:solidFill>
-                      <a:srgbClr val="FFFF00">
-                        <a:alpha val="40000"/>
-                      </a:srgbClr>
-                    </a:solidFill>
-                  </a:tcPr>
-                </a:tc>
-              </a:tr>
-              <a:tr h="957676">
-                <a:tc>
-                  <a:txBody>
-                    <a:bodyPr/>
-                    <a:lstStyle/>
-                    <a:p>
-                      <a:r>
-                        <a:rPr lang="en-US" sz="2800" dirty="0" smtClean="0"/>
-                        <a:t>10</a:t>
-                      </a:r>
-                      <a:endParaRPr lang="en-US" sz="2800" dirty="0"/>
-                    </a:p>
-                  </a:txBody>
-                  <a:tcPr/>
-                </a:tc>
-                <a:tc>
-                  <a:txBody>
-                    <a:bodyPr/>
-                    <a:lstStyle/>
-                    <a:p>
-                      <a:pPr marL="0" marR="0" indent="0" algn="l" defTabSz="457200" rtl="0" eaLnBrk="1" fontAlgn="auto" latinLnBrk="0" hangingPunct="1">
-                        <a:lnSpc>
-                          <a:spcPct val="100000"/>
-                        </a:lnSpc>
-                        <a:spcBef>
-                          <a:spcPts val="0"/>
-                        </a:spcBef>
-                        <a:spcAft>
-                          <a:spcPts val="0"/>
-                        </a:spcAft>
-                        <a:buClrTx/>
-                        <a:buSzTx/>
-                        <a:buFontTx/>
-                        <a:buNone/>
-                        <a:tabLst/>
-                        <a:defRPr/>
-                      </a:pPr>
-                      <a:r>
-                        <a:rPr lang="en-US" sz="2800" dirty="0" smtClean="0"/>
-                        <a:t>Publishing</a:t>
-                      </a:r>
-                      <a:r>
-                        <a:rPr lang="en-US" sz="2800" baseline="0" dirty="0" smtClean="0"/>
-                        <a:t> to </a:t>
-                      </a:r>
-                      <a:r>
-                        <a:rPr lang="en-US" sz="2800" dirty="0" smtClean="0"/>
-                        <a:t>the Google Play Store</a:t>
-                      </a:r>
-                    </a:p>
-                  </a:txBody>
-                  <a:tcPr/>
-                </a:tc>
-              </a:tr>
-            </a:tbl>
-          </a:graphicData>
-        </a:graphic>
-      </p:graphicFrame>
-    </p:spTree>
-    <p:extLst>
-      <p:ext uri="{BB962C8B-B14F-4D97-AF65-F5344CB8AC3E}">
-        <p14:creationId xmlns:p14="http://schemas.microsoft.com/office/powerpoint/2010/main" val="1551616293"/>
-      </p:ext>
-    </p:extLst>
-  </p:cSld>
-  <p:clrMapOvr>
-    <a:masterClrMapping/>
-  </p:clrMapOvr>
-  <p:timing>
-    <p:tnLst>
-      <p:par>
-        <p:cTn xmlns:p14="http://schemas.microsoft.com/office/powerpoint/2010/main" id="1" dur="indefinite" restart="never" nodeType="tmRoot"/>
-      </p:par>
-    </p:tnLst>
-  </p:timing>
-</p:sld>
-</file>
-
-<file path=ppt/slides/slide3.xml><?xml version="1.0" encoding="utf-8"?>
-<p:sld xmlns:a="http://schemas.openxmlformats.org/drawingml/2006/main" xmlns:r="http://schemas.openxmlformats.org/officeDocument/2006/relationships" xmlns:p="http://schemas.openxmlformats.org/presentationml/2006/main">
-  <p:cSld>
-    <p:spTree>
-      <p:nvGrpSpPr>
-        <p:cNvPr id="1" name=""/>
-        <p:cNvGrpSpPr/>
-        <p:nvPr/>
-      </p:nvGrpSpPr>
-      <p:grpSpPr>
-        <a:xfrm>
-          <a:off x="0" y="0"/>
-          <a:ext cx="0" cy="0"/>
-          <a:chOff x="0" y="0"/>
-          <a:chExt cx="0" cy="0"/>
-        </a:xfrm>
-      </p:grpSpPr>
-      <p:sp>
-        <p:nvSpPr>
-          <p:cNvPr id="5" name="Title 4"/>
-          <p:cNvSpPr>
-            <a:spLocks noGrp="1"/>
-          </p:cNvSpPr>
-          <p:nvPr>
-            <p:ph type="title"/>
-          </p:nvPr>
-        </p:nvSpPr>
-        <p:spPr/>
-        <p:txBody>
-          <a:bodyPr/>
-          <a:lstStyle/>
-          <a:p>
-            <a:r>
-              <a:rPr lang="en-US" dirty="0"/>
-              <a:t>This Week’s Assignments</a:t>
-            </a:r>
-          </a:p>
-        </p:txBody>
-      </p:sp>
-      <p:sp>
-        <p:nvSpPr>
-          <p:cNvPr id="6" name="Content Placeholder 5"/>
-          <p:cNvSpPr>
-            <a:spLocks noGrp="1"/>
-          </p:cNvSpPr>
-          <p:nvPr>
-            <p:ph idx="1"/>
-          </p:nvPr>
-        </p:nvSpPr>
-        <p:spPr/>
-        <p:txBody>
-          <a:bodyPr>
-            <a:normAutofit/>
-          </a:bodyPr>
-          <a:lstStyle/>
-          <a:p>
-            <a:r>
-              <a:rPr lang="en-US" dirty="0"/>
-              <a:t>Due Tuesday</a:t>
-            </a:r>
-          </a:p>
-          <a:p>
-            <a:pPr lvl="1"/>
-            <a:r>
-              <a:rPr lang="en-US" dirty="0"/>
-              <a:t>Reading quiz 9, geolocation</a:t>
-            </a:r>
-          </a:p>
-          <a:p>
-            <a:r>
-              <a:rPr lang="en-US" dirty="0" smtClean="0"/>
-              <a:t>Due Saturday</a:t>
-            </a:r>
-          </a:p>
-          <a:p>
-            <a:pPr lvl="1"/>
-            <a:r>
-              <a:rPr lang="en-US" dirty="0"/>
-              <a:t> Lab </a:t>
-            </a:r>
-            <a:r>
-              <a:rPr lang="en-US" dirty="0" smtClean="0"/>
-              <a:t>8, </a:t>
-            </a:r>
-            <a:r>
-              <a:rPr lang="en-US" dirty="0"/>
-              <a:t>tide app with web service, final version</a:t>
-            </a:r>
-          </a:p>
-          <a:p>
-            <a:pPr lvl="1"/>
-            <a:r>
-              <a:rPr lang="en-US" dirty="0" smtClean="0"/>
-              <a:t>Lab </a:t>
-            </a:r>
-            <a:r>
-              <a:rPr lang="en-US" dirty="0"/>
-              <a:t>9</a:t>
-            </a:r>
-            <a:r>
-              <a:rPr lang="en-US" dirty="0" smtClean="0"/>
-              <a:t> </a:t>
-            </a:r>
-            <a:r>
-              <a:rPr lang="en-US" dirty="0"/>
-              <a:t>beta, tide app with geolocation</a:t>
-            </a:r>
-          </a:p>
-          <a:p>
-            <a:endParaRPr lang="en-US" dirty="0"/>
-          </a:p>
-        </p:txBody>
-      </p:sp>
-    </p:spTree>
-    <p:extLst>
-      <p:ext uri="{BB962C8B-B14F-4D97-AF65-F5344CB8AC3E}">
-        <p14:creationId xmlns:p14="http://schemas.microsoft.com/office/powerpoint/2010/main" val="2365596794"/>
-      </p:ext>
-    </p:extLst>
-  </p:cSld>
-  <p:clrMapOvr>
-    <a:masterClrMapping/>
-  </p:clrMapOvr>
-</p:sld>
-</file>
-
-<file path=ppt/slides/slide4.xml><?xml version="1.0" encoding="utf-8"?>
-<p:sld xmlns:a="http://schemas.openxmlformats.org/drawingml/2006/main" xmlns:r="http://schemas.openxmlformats.org/officeDocument/2006/relationships" xmlns:p="http://schemas.openxmlformats.org/presentationml/2006/main">
-  <p:cSld>
-    <p:spTree>
-      <p:nvGrpSpPr>
-        <p:cNvPr id="1" name=""/>
-        <p:cNvGrpSpPr/>
-        <p:nvPr/>
-      </p:nvGrpSpPr>
-      <p:grpSpPr>
-        <a:xfrm>
-          <a:off x="0" y="0"/>
-          <a:ext cx="0" cy="0"/>
-          <a:chOff x="0" y="0"/>
-          <a:chExt cx="0" cy="0"/>
-        </a:xfrm>
-      </p:grpSpPr>
-      <p:sp>
-        <p:nvSpPr>
-          <p:cNvPr id="5" name="Title 4"/>
-          <p:cNvSpPr>
-            <a:spLocks noGrp="1"/>
-          </p:cNvSpPr>
-          <p:nvPr>
-            <p:ph type="title"/>
-          </p:nvPr>
-        </p:nvSpPr>
-        <p:spPr/>
-        <p:txBody>
-          <a:bodyPr/>
-          <a:lstStyle/>
-          <a:p>
-            <a:r>
-              <a:rPr lang="en-US" dirty="0" smtClean="0"/>
-              <a:t>Next Week’s Assignments</a:t>
-            </a:r>
-            <a:endParaRPr lang="en-US" dirty="0"/>
-          </a:p>
-        </p:txBody>
-      </p:sp>
-      <p:sp>
-        <p:nvSpPr>
-          <p:cNvPr id="6" name="Content Placeholder 5"/>
-          <p:cNvSpPr>
-            <a:spLocks noGrp="1"/>
-          </p:cNvSpPr>
-          <p:nvPr>
-            <p:ph idx="1"/>
-          </p:nvPr>
-        </p:nvSpPr>
-        <p:spPr/>
-        <p:txBody>
-          <a:bodyPr>
-            <a:normAutofit/>
-          </a:bodyPr>
-          <a:lstStyle/>
-          <a:p>
-            <a:r>
-              <a:rPr lang="en-US" dirty="0"/>
-              <a:t>Due </a:t>
-            </a:r>
-            <a:r>
-              <a:rPr lang="en-US" dirty="0" smtClean="0"/>
-              <a:t> next Tuesday</a:t>
-            </a:r>
-            <a:endParaRPr lang="en-US" dirty="0"/>
-          </a:p>
-          <a:p>
-            <a:pPr lvl="1"/>
-            <a:r>
-              <a:rPr lang="en-US" dirty="0"/>
-              <a:t>Reading quiz </a:t>
-            </a:r>
-            <a:r>
-              <a:rPr lang="en-US" dirty="0" smtClean="0"/>
-              <a:t>10, Google Play Store</a:t>
-            </a:r>
-            <a:endParaRPr lang="en-US" dirty="0"/>
-          </a:p>
-          <a:p>
-            <a:r>
-              <a:rPr lang="en-US" dirty="0" smtClean="0"/>
-              <a:t>Due </a:t>
-            </a:r>
-            <a:r>
-              <a:rPr lang="en-US" u="sng" dirty="0" smtClean="0"/>
-              <a:t>next Saturday</a:t>
-            </a:r>
-          </a:p>
-          <a:p>
-            <a:pPr lvl="1"/>
-            <a:r>
-              <a:rPr lang="en-US" dirty="0" smtClean="0"/>
-              <a:t>Lab </a:t>
-            </a:r>
-            <a:r>
-              <a:rPr lang="en-US" dirty="0"/>
-              <a:t>9</a:t>
-            </a:r>
-            <a:r>
-              <a:rPr lang="en-US" dirty="0" smtClean="0"/>
-              <a:t> </a:t>
-            </a:r>
-            <a:r>
-              <a:rPr lang="en-US" dirty="0" smtClean="0"/>
-              <a:t>final version, </a:t>
-            </a:r>
-            <a:r>
-              <a:rPr lang="en-US" dirty="0"/>
-              <a:t>tide app with </a:t>
-            </a:r>
-            <a:r>
-              <a:rPr lang="en-US" dirty="0" smtClean="0"/>
-              <a:t>geolocation</a:t>
-            </a:r>
-          </a:p>
-          <a:p>
-            <a:pPr lvl="1"/>
-            <a:r>
-              <a:rPr lang="en-US" u="sng" dirty="0" smtClean="0"/>
-              <a:t>Term project beta</a:t>
-            </a:r>
-            <a:endParaRPr lang="en-US" u="sng" dirty="0"/>
-          </a:p>
-        </p:txBody>
-      </p:sp>
-    </p:spTree>
-    <p:extLst>
-      <p:ext uri="{BB962C8B-B14F-4D97-AF65-F5344CB8AC3E}">
-        <p14:creationId xmlns:p14="http://schemas.microsoft.com/office/powerpoint/2010/main" val="3980683164"/>
-      </p:ext>
-    </p:extLst>
-  </p:cSld>
-  <p:clrMapOvr>
-    <a:masterClrMapping/>
-  </p:clrMapOvr>
-</p:sld>
-</file>
-
-<file path=ppt/slides/slide5.xml><?xml version="1.0" encoding="utf-8"?>
-<p:sld xmlns:a="http://schemas.openxmlformats.org/drawingml/2006/main" xmlns:r="http://schemas.openxmlformats.org/officeDocument/2006/relationships" xmlns:p="http://schemas.openxmlformats.org/presentationml/2006/main">
-  <p:cSld>
-    <p:spTree>
-      <p:nvGrpSpPr>
-        <p:cNvPr id="1" name=""/>
-        <p:cNvGrpSpPr/>
-        <p:nvPr/>
-      </p:nvGrpSpPr>
-      <p:grpSpPr>
-        <a:xfrm>
-          <a:off x="0" y="0"/>
-          <a:ext cx="0" cy="0"/>
-          <a:chOff x="0" y="0"/>
-          <a:chExt cx="0" cy="0"/>
-        </a:xfrm>
-      </p:grpSpPr>
-      <p:sp>
-        <p:nvSpPr>
-          <p:cNvPr id="2" name="Title 1"/>
-          <p:cNvSpPr>
-            <a:spLocks noGrp="1"/>
-          </p:cNvSpPr>
-          <p:nvPr>
-            <p:ph type="title"/>
-          </p:nvPr>
-        </p:nvSpPr>
-        <p:spPr/>
-        <p:txBody>
-          <a:bodyPr/>
-          <a:lstStyle/>
-          <a:p>
-            <a:r>
-              <a:rPr lang="en-US" dirty="0" smtClean="0"/>
-              <a:t>Google io 2016</a:t>
-            </a:r>
-            <a:endParaRPr lang="en-US" dirty="0"/>
-          </a:p>
-        </p:txBody>
-      </p:sp>
-      <p:pic>
-        <p:nvPicPr>
-          <p:cNvPr id="4" name="Content Placeholder 3"/>
-          <p:cNvPicPr>
-            <a:picLocks noGrp="1" noChangeAspect="1"/>
-          </p:cNvPicPr>
-          <p:nvPr>
-            <p:ph idx="1"/>
-          </p:nvPr>
-        </p:nvPicPr>
-        <p:blipFill>
-          <a:blip r:embed="rId2"/>
-          <a:srcRect t="1353" b="1353"/>
-          <a:stretch>
-            <a:fillRect/>
-          </a:stretch>
-        </p:blipFill>
-        <p:spPr/>
-      </p:pic>
-    </p:spTree>
-    <p:extLst>
-      <p:ext uri="{BB962C8B-B14F-4D97-AF65-F5344CB8AC3E}">
-        <p14:creationId xmlns:p14="http://schemas.microsoft.com/office/powerpoint/2010/main" val="403395728"/>
-      </p:ext>
-    </p:extLst>
-  </p:cSld>
-  <p:clrMapOvr>
-    <a:masterClrMapping/>
-  </p:clrMapOvr>
-</p:sld>
-</file>
-
-<file path=ppt/slides/slide6.xml><?xml version="1.0" encoding="utf-8"?>
-<p:sld xmlns:a="http://schemas.openxmlformats.org/drawingml/2006/main" xmlns:r="http://schemas.openxmlformats.org/officeDocument/2006/relationships" xmlns:p="http://schemas.openxmlformats.org/presentationml/2006/main">
-  <p:cSld>
-    <p:spTree>
-      <p:nvGrpSpPr>
-        <p:cNvPr id="1" name=""/>
-        <p:cNvGrpSpPr/>
-        <p:nvPr/>
-      </p:nvGrpSpPr>
-      <p:grpSpPr>
-        <a:xfrm>
-          <a:off x="0" y="0"/>
-          <a:ext cx="0" cy="0"/>
-          <a:chOff x="0" y="0"/>
-          <a:chExt cx="0" cy="0"/>
-        </a:xfrm>
-      </p:grpSpPr>
-      <p:sp>
-        <p:nvSpPr>
-          <p:cNvPr id="2" name="Title 1"/>
-          <p:cNvSpPr>
-            <a:spLocks noGrp="1"/>
-          </p:cNvSpPr>
-          <p:nvPr>
-            <p:ph type="title"/>
-          </p:nvPr>
-        </p:nvSpPr>
-        <p:spPr/>
-        <p:txBody>
-          <a:bodyPr>
-            <a:normAutofit fontScale="90000"/>
-          </a:bodyPr>
-          <a:lstStyle/>
-          <a:p>
-            <a:r>
-              <a:rPr lang="en-US" sz="3100" dirty="0"/>
-              <a:t>Google I/O Announcement:</a:t>
-            </a:r>
-            <a:r>
-              <a:rPr lang="en-US" sz="2200" dirty="0"/>
-              <a:t/>
-            </a:r>
-            <a:br>
-              <a:rPr lang="en-US" sz="2200" dirty="0"/>
-            </a:br>
-            <a:r>
-              <a:rPr lang="en-US" dirty="0" smtClean="0"/>
-              <a:t>Android N</a:t>
-            </a:r>
-            <a:endParaRPr lang="en-US" dirty="0"/>
-          </a:p>
-        </p:txBody>
-      </p:sp>
-      <p:sp>
-        <p:nvSpPr>
-          <p:cNvPr id="3" name="Content Placeholder 2"/>
-          <p:cNvSpPr>
-            <a:spLocks noGrp="1"/>
-          </p:cNvSpPr>
-          <p:nvPr>
-            <p:ph idx="1"/>
-          </p:nvPr>
-        </p:nvSpPr>
-        <p:spPr>
-          <a:xfrm>
-            <a:off x="457200" y="1875646"/>
-            <a:ext cx="6083300" cy="4525963"/>
-          </a:xfrm>
-        </p:spPr>
-        <p:txBody>
-          <a:bodyPr>
-            <a:normAutofit fontScale="85000" lnSpcReduction="20000"/>
-          </a:bodyPr>
-          <a:lstStyle/>
-          <a:p>
-            <a:r>
-              <a:rPr lang="en-US" dirty="0" smtClean="0"/>
-              <a:t>Multi-window (two apps on screen!)</a:t>
-            </a:r>
-          </a:p>
-          <a:p>
-            <a:r>
-              <a:rPr lang="en-US" dirty="0" smtClean="0"/>
-              <a:t>OS updates in the background</a:t>
-            </a:r>
-          </a:p>
-          <a:p>
-            <a:r>
-              <a:rPr lang="en-US" dirty="0" smtClean="0"/>
-              <a:t>Vulcan 3D: high performance rendering</a:t>
-            </a:r>
-          </a:p>
-          <a:p>
-            <a:r>
-              <a:rPr lang="en-US" dirty="0"/>
-              <a:t>Daydream: Successor to Cardboard VR, new headsets coming</a:t>
-            </a:r>
-          </a:p>
-          <a:p>
-            <a:r>
-              <a:rPr lang="en-US" dirty="0" smtClean="0"/>
-              <a:t>Faster, more efficient Java JIT compiler</a:t>
-            </a:r>
-          </a:p>
-          <a:p>
-            <a:r>
-              <a:rPr lang="en-US" dirty="0" smtClean="0"/>
-              <a:t>Coming later </a:t>
-            </a:r>
-            <a:r>
-              <a:rPr lang="en-US" dirty="0"/>
-              <a:t>this summer</a:t>
-            </a:r>
-          </a:p>
-          <a:p>
-            <a:pPr lvl="1"/>
-            <a:endParaRPr lang="en-US" dirty="0"/>
-          </a:p>
-        </p:txBody>
-      </p:sp>
-      <p:pic>
-        <p:nvPicPr>
-          <p:cNvPr id="5" name="Picture 4"/>
-          <p:cNvPicPr>
-            <a:picLocks noChangeAspect="1"/>
-          </p:cNvPicPr>
-          <p:nvPr/>
-        </p:nvPicPr>
-        <p:blipFill rotWithShape="1">
-          <a:blip r:embed="rId2"/>
-          <a:srcRect l="4028" t="6704" r="72500" b="3737"/>
-          <a:stretch/>
-        </p:blipFill>
-        <p:spPr>
-          <a:xfrm>
-            <a:off x="6680200" y="1884362"/>
-            <a:ext cx="2146300" cy="4241800"/>
-          </a:xfrm>
-          <a:prstGeom prst="rect">
-            <a:avLst/>
-          </a:prstGeom>
-        </p:spPr>
-      </p:pic>
-    </p:spTree>
-    <p:extLst>
-      <p:ext uri="{BB962C8B-B14F-4D97-AF65-F5344CB8AC3E}">
-        <p14:creationId xmlns:p14="http://schemas.microsoft.com/office/powerpoint/2010/main" val="1802223045"/>
-      </p:ext>
-    </p:extLst>
-  </p:cSld>
-  <p:clrMapOvr>
-    <a:masterClrMapping/>
-  </p:clrMapOvr>
-</p:sld>
-</file>
-
-<file path=ppt/slides/slide7.xml><?xml version="1.0" encoding="utf-8"?>
-<p:sld xmlns:a="http://schemas.openxmlformats.org/drawingml/2006/main" xmlns:r="http://schemas.openxmlformats.org/officeDocument/2006/relationships" xmlns:p="http://schemas.openxmlformats.org/presentationml/2006/main">
-  <p:cSld>
-    <p:spTree>
-      <p:nvGrpSpPr>
-        <p:cNvPr id="1" name=""/>
-        <p:cNvGrpSpPr/>
-        <p:nvPr/>
-      </p:nvGrpSpPr>
-      <p:grpSpPr>
-        <a:xfrm>
-          <a:off x="0" y="0"/>
-          <a:ext cx="0" cy="0"/>
-          <a:chOff x="0" y="0"/>
-          <a:chExt cx="0" cy="0"/>
-        </a:xfrm>
-      </p:grpSpPr>
-      <p:sp>
-        <p:nvSpPr>
-          <p:cNvPr id="2" name="Title 1"/>
-          <p:cNvSpPr>
-            <a:spLocks noGrp="1"/>
-          </p:cNvSpPr>
-          <p:nvPr>
-            <p:ph type="title"/>
-          </p:nvPr>
-        </p:nvSpPr>
-        <p:spPr/>
-        <p:txBody>
-          <a:bodyPr>
-            <a:normAutofit fontScale="90000"/>
-          </a:bodyPr>
-          <a:lstStyle/>
-          <a:p>
-            <a:r>
-              <a:rPr lang="en-US" sz="2700" dirty="0"/>
-              <a:t>Google I/O </a:t>
-            </a:r>
-            <a:r>
-              <a:rPr lang="en-US" sz="2700" dirty="0" smtClean="0"/>
-              <a:t>Announcement:</a:t>
-            </a:r>
-            <a:r>
-              <a:rPr lang="en-US" sz="2200" dirty="0" smtClean="0"/>
-              <a:t/>
-            </a:r>
-            <a:br>
-              <a:rPr lang="en-US" sz="2200" dirty="0" smtClean="0"/>
-            </a:br>
-            <a:r>
-              <a:rPr lang="en-US" dirty="0" smtClean="0"/>
-              <a:t>Android Apps on Chrome</a:t>
-            </a:r>
-            <a:endParaRPr lang="en-US" dirty="0"/>
-          </a:p>
-        </p:txBody>
-      </p:sp>
-      <p:sp>
-        <p:nvSpPr>
-          <p:cNvPr id="5" name="Content Placeholder 4"/>
-          <p:cNvSpPr>
-            <a:spLocks noGrp="1"/>
-          </p:cNvSpPr>
-          <p:nvPr>
-            <p:ph idx="1"/>
-          </p:nvPr>
-        </p:nvSpPr>
-        <p:spPr>
-          <a:xfrm>
-            <a:off x="457200" y="1600201"/>
-            <a:ext cx="8229600" cy="1625599"/>
-          </a:xfrm>
-        </p:spPr>
-        <p:txBody>
-          <a:bodyPr>
-            <a:normAutofit lnSpcReduction="10000"/>
-          </a:bodyPr>
-          <a:lstStyle/>
-          <a:p>
-            <a:r>
-              <a:rPr lang="en-US" dirty="0" smtClean="0"/>
-              <a:t>Google Play Store on Chrome</a:t>
-            </a:r>
-          </a:p>
-          <a:p>
-            <a:r>
-              <a:rPr lang="en-US" dirty="0" smtClean="0"/>
-              <a:t>Available Imminently</a:t>
-            </a:r>
-            <a:endParaRPr lang="en-US" dirty="0"/>
-          </a:p>
-        </p:txBody>
-      </p:sp>
-      <p:pic>
-        <p:nvPicPr>
-          <p:cNvPr id="6" name="Content Placeholder 3"/>
-          <p:cNvPicPr>
-            <a:picLocks noChangeAspect="1"/>
-          </p:cNvPicPr>
-          <p:nvPr/>
-        </p:nvPicPr>
-        <p:blipFill rotWithShape="1">
-          <a:blip r:embed="rId2"/>
-          <a:srcRect l="24144" t="2525" r="18011" b="4033"/>
-          <a:stretch/>
-        </p:blipFill>
-        <p:spPr>
-          <a:xfrm>
-            <a:off x="2514600" y="3589217"/>
-            <a:ext cx="3987800" cy="2760784"/>
-          </a:xfrm>
-          <a:prstGeom prst="rect">
-            <a:avLst/>
-          </a:prstGeom>
-        </p:spPr>
-      </p:pic>
-    </p:spTree>
-    <p:extLst>
-      <p:ext uri="{BB962C8B-B14F-4D97-AF65-F5344CB8AC3E}">
-        <p14:creationId xmlns:p14="http://schemas.microsoft.com/office/powerpoint/2010/main" val="3681107296"/>
-      </p:ext>
-    </p:extLst>
-  </p:cSld>
-  <p:clrMapOvr>
-    <a:masterClrMapping/>
-  </p:clrMapOvr>
-</p:sld>
-</file>
-
 <file path=ppt/slides/slide8.xml><?xml version="1.0" encoding="utf-8"?>
 <p:sld xmlns:a="http://schemas.openxmlformats.org/drawingml/2006/main" xmlns:r="http://schemas.openxmlformats.org/officeDocument/2006/relationships" xmlns:p="http://schemas.openxmlformats.org/presentationml/2006/main">
   <p:cSld>
@@ -6816,82 +6049,81 @@
         </p:nvSpPr>
         <p:spPr/>
         <p:txBody>
+          <a:bodyPr/>
+          <a:lstStyle/>
+          <a:p>
+            <a:r>
+              <a:rPr lang="en-US" dirty="0" smtClean="0"/>
+              <a:t>Fused Location Provider</a:t>
+            </a:r>
+            <a:endParaRPr lang="en-US" dirty="0"/>
+          </a:p>
+        </p:txBody>
+      </p:sp>
+      <p:sp>
+        <p:nvSpPr>
+          <p:cNvPr id="3" name="Content Placeholder 2"/>
+          <p:cNvSpPr>
+            <a:spLocks noGrp="1"/>
+          </p:cNvSpPr>
+          <p:nvPr>
+            <p:ph idx="1"/>
+          </p:nvPr>
+        </p:nvSpPr>
+        <p:spPr/>
+        <p:txBody>
           <a:bodyPr>
-            <a:normAutofit fontScale="90000"/>
+            <a:normAutofit fontScale="92500" lnSpcReduction="20000"/>
           </a:bodyPr>
           <a:lstStyle/>
           <a:p>
             <a:r>
               <a:rPr lang="en-US" dirty="0" smtClean="0"/>
-              <a:t>More Google I/O Announcements</a:t>
-            </a:r>
+              <a:t>Gets the best available provider</a:t>
+            </a:r>
+          </a:p>
+          <a:p>
+            <a:r>
+              <a:rPr lang="en-US" dirty="0" smtClean="0"/>
+              <a:t>Provides last known location (usually current)</a:t>
+            </a:r>
+          </a:p>
+          <a:p>
+            <a:r>
+              <a:rPr lang="en-US" dirty="0" smtClean="0"/>
+              <a:t>Provides continuous location updates</a:t>
+            </a:r>
+          </a:p>
+          <a:p>
+            <a:r>
+              <a:rPr lang="en-US" dirty="0" smtClean="0"/>
+              <a:t> Location client</a:t>
+            </a:r>
+          </a:p>
+          <a:p>
+            <a:pPr lvl="1"/>
+            <a:r>
+              <a:rPr lang="en-US" dirty="0" smtClean="0"/>
+              <a:t>Connects to Google Play Services</a:t>
+            </a:r>
+          </a:p>
+          <a:p>
+            <a:pPr lvl="1"/>
+            <a:r>
+              <a:rPr lang="en-US" dirty="0" smtClean="0"/>
+              <a:t>Developer needs to implement interfaces for callbacks</a:t>
+            </a:r>
+          </a:p>
+          <a:p>
+            <a:pPr lvl="1"/>
             <a:endParaRPr lang="en-US" dirty="0"/>
-          </a:p>
-        </p:txBody>
-      </p:sp>
-      <p:sp>
-        <p:nvSpPr>
-          <p:cNvPr id="3" name="Content Placeholder 2"/>
-          <p:cNvSpPr>
-            <a:spLocks noGrp="1"/>
-          </p:cNvSpPr>
-          <p:nvPr>
-            <p:ph idx="1"/>
-          </p:nvPr>
-        </p:nvSpPr>
-        <p:spPr/>
-        <p:txBody>
-          <a:bodyPr>
-            <a:normAutofit fontScale="77500" lnSpcReduction="20000"/>
-          </a:bodyPr>
-          <a:lstStyle/>
-          <a:p>
-            <a:r>
-              <a:rPr lang="en-US" dirty="0" smtClean="0"/>
-              <a:t>Allo: new chat app (competes with FB messenger)</a:t>
-            </a:r>
-          </a:p>
-          <a:p>
-            <a:r>
-              <a:rPr lang="en-US" dirty="0" smtClean="0"/>
-              <a:t>Assistant: with better AI than Google Now</a:t>
-            </a:r>
-          </a:p>
-          <a:p>
-            <a:r>
-              <a:rPr lang="en-US" dirty="0" smtClean="0"/>
-              <a:t>Duo: Video calling (like FaceTime)</a:t>
-            </a:r>
-          </a:p>
-          <a:p>
-            <a:r>
-              <a:rPr lang="en-US" dirty="0" smtClean="0"/>
-              <a:t>Android Wear 2.0: No phone tether needed</a:t>
-            </a:r>
-          </a:p>
-          <a:p>
-            <a:r>
-              <a:rPr lang="en-US" dirty="0"/>
-              <a:t>Instant Apps: Load just a piece of an app on your </a:t>
-            </a:r>
-            <a:r>
-              <a:rPr lang="en-US" dirty="0" smtClean="0"/>
-              <a:t>device, loads like a web page</a:t>
-            </a:r>
-            <a:endParaRPr lang="en-US" dirty="0"/>
-          </a:p>
-          <a:p>
-            <a:r>
-              <a:rPr lang="en-US" dirty="0" smtClean="0"/>
-              <a:t>Firebase 2.0: Free service for developers, providing app usage analytics, cloud APIs, app testing, and more</a:t>
-            </a:r>
           </a:p>
         </p:txBody>
       </p:sp>
     </p:spTree>
     <p:extLst>
       <p:ext uri="{BB962C8B-B14F-4D97-AF65-F5344CB8AC3E}">
-        <p14:creationId xmlns:p14="http://schemas.microsoft.com/office/powerpoint/2010/main" val="2677928206"/>
+        <p14:creationId xmlns:p14="http://schemas.microsoft.com/office/powerpoint/2010/main" val="418407440"/>
       </p:ext>
     </p:extLst>
   </p:cSld>
@@ -6935,35 +6167,75 @@
           <a:p>
             <a:r>
               <a:rPr lang="en-US" dirty="0" smtClean="0"/>
-              <a:t>Geolocation</a:t>
+              <a:t>Related APIs</a:t>
             </a:r>
             <a:endParaRPr lang="en-US" dirty="0"/>
           </a:p>
         </p:txBody>
       </p:sp>
-      <p:pic>
-        <p:nvPicPr>
-          <p:cNvPr id="4" name="Content Placeholder 3"/>
-          <p:cNvPicPr>
-            <a:picLocks noGrp="1" noChangeAspect="1"/>
-          </p:cNvPicPr>
+      <p:sp>
+        <p:nvSpPr>
+          <p:cNvPr id="3" name="Content Placeholder 2"/>
+          <p:cNvSpPr>
+            <a:spLocks noGrp="1"/>
+          </p:cNvSpPr>
           <p:nvPr>
             <p:ph idx="1"/>
           </p:nvPr>
-        </p:nvPicPr>
-        <p:blipFill>
-          <a:blip r:embed="rId3"/>
-          <a:srcRect t="1337" b="1337"/>
-          <a:stretch>
-            <a:fillRect/>
-          </a:stretch>
-        </p:blipFill>
-        <p:spPr/>
-      </p:pic>
+        </p:nvSpPr>
+        <p:spPr/>
+        <p:txBody>
+          <a:bodyPr>
+            <a:normAutofit fontScale="92500" lnSpcReduction="20000"/>
+          </a:bodyPr>
+          <a:lstStyle/>
+          <a:p>
+            <a:r>
+              <a:rPr lang="en-US" dirty="0" smtClean="0"/>
+              <a:t>Geocoder</a:t>
+            </a:r>
+          </a:p>
+          <a:p>
+            <a:pPr lvl="1"/>
+            <a:r>
+              <a:rPr lang="en-US" dirty="0" smtClean="0"/>
+              <a:t>Get address from latitude and longitude</a:t>
+            </a:r>
+          </a:p>
+          <a:p>
+            <a:pPr lvl="1"/>
+            <a:r>
+              <a:rPr lang="en-US" dirty="0" smtClean="0"/>
+              <a:t>Get latitude and longitude from address</a:t>
+            </a:r>
+          </a:p>
+          <a:p>
+            <a:r>
+              <a:rPr lang="en-US" dirty="0" smtClean="0"/>
+              <a:t>Geofencing</a:t>
+            </a:r>
+          </a:p>
+          <a:p>
+            <a:pPr lvl="1"/>
+            <a:r>
+              <a:rPr lang="en-US" dirty="0" smtClean="0"/>
+              <a:t>Monitor distance from a point of interest</a:t>
+            </a:r>
+          </a:p>
+          <a:p>
+            <a:pPr lvl="1"/>
+            <a:r>
+              <a:rPr lang="en-US" dirty="0" smtClean="0"/>
+              <a:t>Get notifications when entering or leaving area of interest</a:t>
+            </a:r>
+            <a:endParaRPr lang="en-US" dirty="0"/>
+          </a:p>
+        </p:txBody>
+      </p:sp>
     </p:spTree>
     <p:extLst>
       <p:ext uri="{BB962C8B-B14F-4D97-AF65-F5344CB8AC3E}">
-        <p14:creationId xmlns:p14="http://schemas.microsoft.com/office/powerpoint/2010/main" val="3363128827"/>
+        <p14:creationId xmlns:p14="http://schemas.microsoft.com/office/powerpoint/2010/main" val="326238305"/>
       </p:ext>
     </p:extLst>
   </p:cSld>

</xml_diff>